<commit_message>
Add synthetic control pdf
</commit_message>
<xml_diff>
--- a/lectures/03_synthetic_control/synthetic_control.pptx
+++ b/lectures/03_synthetic_control/synthetic_control.pptx
@@ -23,32 +23,32 @@
     <p:sldId id="401" r:id="rId14"/>
     <p:sldId id="414" r:id="rId15"/>
     <p:sldId id="415" r:id="rId16"/>
-    <p:sldId id="416" r:id="rId17"/>
-    <p:sldId id="417" r:id="rId18"/>
-    <p:sldId id="418" r:id="rId19"/>
-    <p:sldId id="419" r:id="rId20"/>
-    <p:sldId id="371" r:id="rId21"/>
-    <p:sldId id="403" r:id="rId22"/>
-    <p:sldId id="412" r:id="rId23"/>
-    <p:sldId id="413" r:id="rId24"/>
-    <p:sldId id="411" r:id="rId25"/>
-    <p:sldId id="372" r:id="rId26"/>
-    <p:sldId id="420" r:id="rId27"/>
-    <p:sldId id="425" r:id="rId28"/>
-    <p:sldId id="426" r:id="rId29"/>
-    <p:sldId id="427" r:id="rId30"/>
-    <p:sldId id="428" r:id="rId31"/>
-    <p:sldId id="429" r:id="rId32"/>
-    <p:sldId id="430" r:id="rId33"/>
-    <p:sldId id="431" r:id="rId34"/>
-    <p:sldId id="432" r:id="rId35"/>
-    <p:sldId id="424" r:id="rId36"/>
-    <p:sldId id="422" r:id="rId37"/>
-    <p:sldId id="421" r:id="rId38"/>
-    <p:sldId id="423" r:id="rId39"/>
-    <p:sldId id="435" r:id="rId40"/>
-    <p:sldId id="436" r:id="rId41"/>
-    <p:sldId id="437" r:id="rId42"/>
+    <p:sldId id="417" r:id="rId17"/>
+    <p:sldId id="418" r:id="rId18"/>
+    <p:sldId id="419" r:id="rId19"/>
+    <p:sldId id="371" r:id="rId20"/>
+    <p:sldId id="403" r:id="rId21"/>
+    <p:sldId id="412" r:id="rId22"/>
+    <p:sldId id="413" r:id="rId23"/>
+    <p:sldId id="411" r:id="rId24"/>
+    <p:sldId id="372" r:id="rId25"/>
+    <p:sldId id="420" r:id="rId26"/>
+    <p:sldId id="425" r:id="rId27"/>
+    <p:sldId id="426" r:id="rId28"/>
+    <p:sldId id="427" r:id="rId29"/>
+    <p:sldId id="428" r:id="rId30"/>
+    <p:sldId id="429" r:id="rId31"/>
+    <p:sldId id="430" r:id="rId32"/>
+    <p:sldId id="431" r:id="rId33"/>
+    <p:sldId id="432" r:id="rId34"/>
+    <p:sldId id="424" r:id="rId35"/>
+    <p:sldId id="422" r:id="rId36"/>
+    <p:sldId id="421" r:id="rId37"/>
+    <p:sldId id="423" r:id="rId38"/>
+    <p:sldId id="435" r:id="rId39"/>
+    <p:sldId id="436" r:id="rId40"/>
+    <p:sldId id="437" r:id="rId41"/>
+    <p:sldId id="438" r:id="rId42"/>
     <p:sldId id="434" r:id="rId43"/>
     <p:sldId id="325" r:id="rId44"/>
     <p:sldId id="364" r:id="rId45"/>
@@ -958,7 +958,7 @@
     </p:spTree>
     <p:extLst>
       <p:ext uri="{BB962C8B-B14F-4D97-AF65-F5344CB8AC3E}">
-        <p14:creationId xmlns:p14="http://schemas.microsoft.com/office/powerpoint/2010/main" val="2685237571"/>
+        <p14:creationId xmlns:p14="http://schemas.microsoft.com/office/powerpoint/2010/main" val="42073789"/>
       </p:ext>
     </p:extLst>
   </p:cSld>
@@ -1048,7 +1048,7 @@
     </p:spTree>
     <p:extLst>
       <p:ext uri="{BB962C8B-B14F-4D97-AF65-F5344CB8AC3E}">
-        <p14:creationId xmlns:p14="http://schemas.microsoft.com/office/powerpoint/2010/main" val="42073789"/>
+        <p14:creationId xmlns:p14="http://schemas.microsoft.com/office/powerpoint/2010/main" val="1863535156"/>
       </p:ext>
     </p:extLst>
   </p:cSld>
@@ -1138,7 +1138,7 @@
     </p:spTree>
     <p:extLst>
       <p:ext uri="{BB962C8B-B14F-4D97-AF65-F5344CB8AC3E}">
-        <p14:creationId xmlns:p14="http://schemas.microsoft.com/office/powerpoint/2010/main" val="1863535156"/>
+        <p14:creationId xmlns:p14="http://schemas.microsoft.com/office/powerpoint/2010/main" val="142730928"/>
       </p:ext>
     </p:extLst>
   </p:cSld>
@@ -1219,7 +1219,7 @@
             <a:pPr lvl="0"/>
             <a:fld id="{8E8F8CAC-A6C2-44BD-8532-85D68FCA9A10}" type="slidenum">
               <a:rPr lang="en-NL" smtClean="0"/>
-              <a:t>19</a:t>
+              <a:t>20</a:t>
             </a:fld>
             <a:endParaRPr lang="en-NL"/>
           </a:p>
@@ -1228,7 +1228,7 @@
     </p:spTree>
     <p:extLst>
       <p:ext uri="{BB962C8B-B14F-4D97-AF65-F5344CB8AC3E}">
-        <p14:creationId xmlns:p14="http://schemas.microsoft.com/office/powerpoint/2010/main" val="142730928"/>
+        <p14:creationId xmlns:p14="http://schemas.microsoft.com/office/powerpoint/2010/main" val="483999717"/>
       </p:ext>
     </p:extLst>
   </p:cSld>
@@ -1318,7 +1318,7 @@
     </p:spTree>
     <p:extLst>
       <p:ext uri="{BB962C8B-B14F-4D97-AF65-F5344CB8AC3E}">
-        <p14:creationId xmlns:p14="http://schemas.microsoft.com/office/powerpoint/2010/main" val="483999717"/>
+        <p14:creationId xmlns:p14="http://schemas.microsoft.com/office/powerpoint/2010/main" val="425689359"/>
       </p:ext>
     </p:extLst>
   </p:cSld>
@@ -1408,7 +1408,7 @@
     </p:spTree>
     <p:extLst>
       <p:ext uri="{BB962C8B-B14F-4D97-AF65-F5344CB8AC3E}">
-        <p14:creationId xmlns:p14="http://schemas.microsoft.com/office/powerpoint/2010/main" val="425689359"/>
+        <p14:creationId xmlns:p14="http://schemas.microsoft.com/office/powerpoint/2010/main" val="25979218"/>
       </p:ext>
     </p:extLst>
   </p:cSld>
@@ -1489,7 +1489,7 @@
             <a:pPr lvl="0"/>
             <a:fld id="{8E8F8CAC-A6C2-44BD-8532-85D68FCA9A10}" type="slidenum">
               <a:rPr lang="en-NL" smtClean="0"/>
-              <a:t>23</a:t>
+              <a:t>24</a:t>
             </a:fld>
             <a:endParaRPr lang="en-NL"/>
           </a:p>
@@ -1498,7 +1498,7 @@
     </p:spTree>
     <p:extLst>
       <p:ext uri="{BB962C8B-B14F-4D97-AF65-F5344CB8AC3E}">
-        <p14:creationId xmlns:p14="http://schemas.microsoft.com/office/powerpoint/2010/main" val="25979218"/>
+        <p14:creationId xmlns:p14="http://schemas.microsoft.com/office/powerpoint/2010/main" val="1375226254"/>
       </p:ext>
     </p:extLst>
   </p:cSld>
@@ -1579,7 +1579,7 @@
             <a:pPr lvl="0"/>
             <a:fld id="{8E8F8CAC-A6C2-44BD-8532-85D68FCA9A10}" type="slidenum">
               <a:rPr lang="en-NL" smtClean="0"/>
-              <a:t>25</a:t>
+              <a:t>26</a:t>
             </a:fld>
             <a:endParaRPr lang="en-NL"/>
           </a:p>
@@ -1588,7 +1588,7 @@
     </p:spTree>
     <p:extLst>
       <p:ext uri="{BB962C8B-B14F-4D97-AF65-F5344CB8AC3E}">
-        <p14:creationId xmlns:p14="http://schemas.microsoft.com/office/powerpoint/2010/main" val="1375226254"/>
+        <p14:creationId xmlns:p14="http://schemas.microsoft.com/office/powerpoint/2010/main" val="1662609198"/>
       </p:ext>
     </p:extLst>
   </p:cSld>
@@ -1678,7 +1678,7 @@
     </p:spTree>
     <p:extLst>
       <p:ext uri="{BB962C8B-B14F-4D97-AF65-F5344CB8AC3E}">
-        <p14:creationId xmlns:p14="http://schemas.microsoft.com/office/powerpoint/2010/main" val="1662609198"/>
+        <p14:creationId xmlns:p14="http://schemas.microsoft.com/office/powerpoint/2010/main" val="112294938"/>
       </p:ext>
     </p:extLst>
   </p:cSld>
@@ -1858,7 +1858,7 @@
     </p:spTree>
     <p:extLst>
       <p:ext uri="{BB962C8B-B14F-4D97-AF65-F5344CB8AC3E}">
-        <p14:creationId xmlns:p14="http://schemas.microsoft.com/office/powerpoint/2010/main" val="112294938"/>
+        <p14:creationId xmlns:p14="http://schemas.microsoft.com/office/powerpoint/2010/main" val="3123127847"/>
       </p:ext>
     </p:extLst>
   </p:cSld>
@@ -1948,7 +1948,7 @@
     </p:spTree>
     <p:extLst>
       <p:ext uri="{BB962C8B-B14F-4D97-AF65-F5344CB8AC3E}">
-        <p14:creationId xmlns:p14="http://schemas.microsoft.com/office/powerpoint/2010/main" val="3123127847"/>
+        <p14:creationId xmlns:p14="http://schemas.microsoft.com/office/powerpoint/2010/main" val="2612037641"/>
       </p:ext>
     </p:extLst>
   </p:cSld>
@@ -2038,7 +2038,7 @@
     </p:spTree>
     <p:extLst>
       <p:ext uri="{BB962C8B-B14F-4D97-AF65-F5344CB8AC3E}">
-        <p14:creationId xmlns:p14="http://schemas.microsoft.com/office/powerpoint/2010/main" val="2612037641"/>
+        <p14:creationId xmlns:p14="http://schemas.microsoft.com/office/powerpoint/2010/main" val="534322986"/>
       </p:ext>
     </p:extLst>
   </p:cSld>
@@ -2128,7 +2128,7 @@
     </p:spTree>
     <p:extLst>
       <p:ext uri="{BB962C8B-B14F-4D97-AF65-F5344CB8AC3E}">
-        <p14:creationId xmlns:p14="http://schemas.microsoft.com/office/powerpoint/2010/main" val="534322986"/>
+        <p14:creationId xmlns:p14="http://schemas.microsoft.com/office/powerpoint/2010/main" val="4272560795"/>
       </p:ext>
     </p:extLst>
   </p:cSld>
@@ -2218,7 +2218,7 @@
     </p:spTree>
     <p:extLst>
       <p:ext uri="{BB962C8B-B14F-4D97-AF65-F5344CB8AC3E}">
-        <p14:creationId xmlns:p14="http://schemas.microsoft.com/office/powerpoint/2010/main" val="4272560795"/>
+        <p14:creationId xmlns:p14="http://schemas.microsoft.com/office/powerpoint/2010/main" val="925318121"/>
       </p:ext>
     </p:extLst>
   </p:cSld>
@@ -2308,7 +2308,7 @@
     </p:spTree>
     <p:extLst>
       <p:ext uri="{BB962C8B-B14F-4D97-AF65-F5344CB8AC3E}">
-        <p14:creationId xmlns:p14="http://schemas.microsoft.com/office/powerpoint/2010/main" val="925318121"/>
+        <p14:creationId xmlns:p14="http://schemas.microsoft.com/office/powerpoint/2010/main" val="3991016552"/>
       </p:ext>
     </p:extLst>
   </p:cSld>
@@ -2389,7 +2389,7 @@
             <a:pPr lvl="0"/>
             <a:fld id="{8E8F8CAC-A6C2-44BD-8532-85D68FCA9A10}" type="slidenum">
               <a:rPr lang="en-NL" smtClean="0"/>
-              <a:t>34</a:t>
+              <a:t>35</a:t>
             </a:fld>
             <a:endParaRPr lang="en-NL"/>
           </a:p>
@@ -2398,7 +2398,7 @@
     </p:spTree>
     <p:extLst>
       <p:ext uri="{BB962C8B-B14F-4D97-AF65-F5344CB8AC3E}">
-        <p14:creationId xmlns:p14="http://schemas.microsoft.com/office/powerpoint/2010/main" val="3991016552"/>
+        <p14:creationId xmlns:p14="http://schemas.microsoft.com/office/powerpoint/2010/main" val="2071890320"/>
       </p:ext>
     </p:extLst>
   </p:cSld>
@@ -2488,7 +2488,7 @@
     </p:spTree>
     <p:extLst>
       <p:ext uri="{BB962C8B-B14F-4D97-AF65-F5344CB8AC3E}">
-        <p14:creationId xmlns:p14="http://schemas.microsoft.com/office/powerpoint/2010/main" val="2071890320"/>
+        <p14:creationId xmlns:p14="http://schemas.microsoft.com/office/powerpoint/2010/main" val="2272136931"/>
       </p:ext>
     </p:extLst>
   </p:cSld>
@@ -2578,7 +2578,7 @@
     </p:spTree>
     <p:extLst>
       <p:ext uri="{BB962C8B-B14F-4D97-AF65-F5344CB8AC3E}">
-        <p14:creationId xmlns:p14="http://schemas.microsoft.com/office/powerpoint/2010/main" val="2272136931"/>
+        <p14:creationId xmlns:p14="http://schemas.microsoft.com/office/powerpoint/2010/main" val="3352213623"/>
       </p:ext>
     </p:extLst>
   </p:cSld>
@@ -2659,7 +2659,7 @@
             <a:pPr lvl="0"/>
             <a:fld id="{8E8F8CAC-A6C2-44BD-8532-85D68FCA9A10}" type="slidenum">
               <a:rPr lang="en-NL" smtClean="0"/>
-              <a:t>38</a:t>
+              <a:t>39</a:t>
             </a:fld>
             <a:endParaRPr lang="en-NL"/>
           </a:p>
@@ -2668,7 +2668,7 @@
     </p:spTree>
     <p:extLst>
       <p:ext uri="{BB962C8B-B14F-4D97-AF65-F5344CB8AC3E}">
-        <p14:creationId xmlns:p14="http://schemas.microsoft.com/office/powerpoint/2010/main" val="3352213623"/>
+        <p14:creationId xmlns:p14="http://schemas.microsoft.com/office/powerpoint/2010/main" val="3397955260"/>
       </p:ext>
     </p:extLst>
   </p:cSld>
@@ -2840,96 +2840,6 @@
             <a:fld id="{8E8F8CAC-A6C2-44BD-8532-85D68FCA9A10}" type="slidenum">
               <a:rPr lang="en-NL" smtClean="0"/>
               <a:t>40</a:t>
-            </a:fld>
-            <a:endParaRPr lang="en-NL"/>
-          </a:p>
-        </p:txBody>
-      </p:sp>
-    </p:spTree>
-    <p:extLst>
-      <p:ext uri="{BB962C8B-B14F-4D97-AF65-F5344CB8AC3E}">
-        <p14:creationId xmlns:p14="http://schemas.microsoft.com/office/powerpoint/2010/main" val="3397955260"/>
-      </p:ext>
-    </p:extLst>
-  </p:cSld>
-  <p:clrMapOvr>
-    <a:masterClrMapping/>
-  </p:clrMapOvr>
-</p:notes>
-</file>
-
-<file path=ppt/notesSlides/notesSlide31.xml><?xml version="1.0" encoding="utf-8"?>
-<p:notes xmlns:a="http://schemas.openxmlformats.org/drawingml/2006/main" xmlns:r="http://schemas.openxmlformats.org/officeDocument/2006/relationships" xmlns:p="http://schemas.openxmlformats.org/presentationml/2006/main">
-  <p:cSld>
-    <p:spTree>
-      <p:nvGrpSpPr>
-        <p:cNvPr id="1" name=""/>
-        <p:cNvGrpSpPr/>
-        <p:nvPr/>
-      </p:nvGrpSpPr>
-      <p:grpSpPr>
-        <a:xfrm>
-          <a:off x="0" y="0"/>
-          <a:ext cx="0" cy="0"/>
-          <a:chOff x="0" y="0"/>
-          <a:chExt cx="0" cy="0"/>
-        </a:xfrm>
-      </p:grpSpPr>
-      <p:sp>
-        <p:nvSpPr>
-          <p:cNvPr id="2" name="Slide Image Placeholder 1"/>
-          <p:cNvSpPr>
-            <a:spLocks noGrp="1" noRot="1" noChangeAspect="1"/>
-          </p:cNvSpPr>
-          <p:nvPr>
-            <p:ph type="sldImg"/>
-          </p:nvPr>
-        </p:nvSpPr>
-        <p:spPr>
-          <a:xfrm>
-            <a:off x="685800" y="1143000"/>
-            <a:ext cx="5486400" cy="3086100"/>
-          </a:xfrm>
-        </p:spPr>
-      </p:sp>
-      <p:sp>
-        <p:nvSpPr>
-          <p:cNvPr id="3" name="Notes Placeholder 2"/>
-          <p:cNvSpPr>
-            <a:spLocks noGrp="1"/>
-          </p:cNvSpPr>
-          <p:nvPr>
-            <p:ph type="body" idx="1"/>
-          </p:nvPr>
-        </p:nvSpPr>
-        <p:spPr/>
-        <p:txBody>
-          <a:bodyPr/>
-          <a:lstStyle/>
-          <a:p>
-            <a:endParaRPr lang="en-NL" dirty="0"/>
-          </a:p>
-        </p:txBody>
-      </p:sp>
-      <p:sp>
-        <p:nvSpPr>
-          <p:cNvPr id="4" name="Slide Number Placeholder 3"/>
-          <p:cNvSpPr>
-            <a:spLocks noGrp="1"/>
-          </p:cNvSpPr>
-          <p:nvPr>
-            <p:ph type="sldNum" sz="quarter" idx="5"/>
-          </p:nvPr>
-        </p:nvSpPr>
-        <p:spPr/>
-        <p:txBody>
-          <a:bodyPr/>
-          <a:lstStyle/>
-          <a:p>
-            <a:pPr lvl="0"/>
-            <a:fld id="{8E8F8CAC-A6C2-44BD-8532-85D68FCA9A10}" type="slidenum">
-              <a:rPr lang="en-NL" smtClean="0"/>
-              <a:t>41</a:t>
             </a:fld>
             <a:endParaRPr lang="en-NL"/>
           </a:p>
@@ -7043,8 +6953,8 @@
           </a:p>
         </p:txBody>
       </p:sp>
-      <mc:AlternateContent xmlns:mc="http://schemas.openxmlformats.org/markup-compatibility/2006">
-        <mc:Choice xmlns:a14="http://schemas.microsoft.com/office/drawing/2010/main" Requires="a14">
+      <mc:AlternateContent xmlns:mc="http://schemas.openxmlformats.org/markup-compatibility/2006" xmlns:a14="http://schemas.microsoft.com/office/drawing/2010/main">
+        <mc:Choice Requires="a14">
           <p:sp>
             <p:nvSpPr>
               <p:cNvPr id="3" name="Content Placeholder 2">
@@ -7344,7 +7254,7 @@
             </p:txBody>
           </p:sp>
         </mc:Choice>
-        <mc:Fallback>
+        <mc:Fallback xmlns="">
           <p:sp>
             <p:nvSpPr>
               <p:cNvPr id="3" name="Content Placeholder 2">
@@ -7673,7 +7583,16 @@
                               </a:solidFill>
                               <a:latin typeface="Cambria Math" panose="02040503050406030204" pitchFamily="18" charset="0"/>
                             </a:rPr>
-                            <m:t>=1</m:t>
+                            <m:t>=</m:t>
+                          </m:r>
+                          <m:r>
+                            <a:rPr lang="en-US" sz="3200" b="0" i="1" smtClean="0">
+                              <a:solidFill>
+                                <a:srgbClr val="404040"/>
+                              </a:solidFill>
+                              <a:latin typeface="Cambria Math" panose="02040503050406030204" pitchFamily="18" charset="0"/>
+                            </a:rPr>
+                            <m:t>1</m:t>
                           </m:r>
                         </m:sub>
                         <m:sup>
@@ -8073,8 +7992,8 @@
           </a:prstGeom>
         </p:spPr>
       </p:pic>
-      <mc:AlternateContent xmlns:mc="http://schemas.openxmlformats.org/markup-compatibility/2006">
-        <mc:Choice xmlns:a14="http://schemas.microsoft.com/office/drawing/2010/main" Requires="a14">
+      <mc:AlternateContent xmlns:mc="http://schemas.openxmlformats.org/markup-compatibility/2006" xmlns:a14="http://schemas.microsoft.com/office/drawing/2010/main">
+        <mc:Choice Requires="a14">
           <p:sp>
             <p:nvSpPr>
               <p:cNvPr id="11" name="TextBox 10">
@@ -8163,7 +8082,7 @@
             </p:txBody>
           </p:sp>
         </mc:Choice>
-        <mc:Fallback>
+        <mc:Fallback xmlns="">
           <p:sp>
             <p:nvSpPr>
               <p:cNvPr id="11" name="TextBox 10">
@@ -8208,8 +8127,8 @@
           </p:sp>
         </mc:Fallback>
       </mc:AlternateContent>
-      <mc:AlternateContent xmlns:mc="http://schemas.openxmlformats.org/markup-compatibility/2006">
-        <mc:Choice xmlns:a14="http://schemas.microsoft.com/office/drawing/2010/main" Requires="a14">
+      <mc:AlternateContent xmlns:mc="http://schemas.openxmlformats.org/markup-compatibility/2006" xmlns:a14="http://schemas.microsoft.com/office/drawing/2010/main">
+        <mc:Choice Requires="a14">
           <p:sp>
             <p:nvSpPr>
               <p:cNvPr id="12" name="TextBox 11">
@@ -8298,7 +8217,7 @@
             </p:txBody>
           </p:sp>
         </mc:Choice>
-        <mc:Fallback>
+        <mc:Fallback xmlns="">
           <p:sp>
             <p:nvSpPr>
               <p:cNvPr id="12" name="TextBox 11">
@@ -8687,7 +8606,25 @@
                 </a:solidFill>
                 <a:latin typeface="Fira Sans" pitchFamily="34"/>
               </a:rPr>
-              <a:t>Choose weights such that the synthetic control looks like the treated unit</a:t>
+              <a:t>Choose weights such that the synthetic control </a:t>
+            </a:r>
+            <a:r>
+              <a:rPr lang="en-GB" sz="3200" b="1" dirty="0">
+                <a:solidFill>
+                  <a:srgbClr val="404040"/>
+                </a:solidFill>
+                <a:latin typeface="Fira Sans" pitchFamily="34"/>
+              </a:rPr>
+              <a:t>looks like</a:t>
+            </a:r>
+            <a:r>
+              <a:rPr lang="en-GB" sz="3200" dirty="0">
+                <a:solidFill>
+                  <a:srgbClr val="404040"/>
+                </a:solidFill>
+                <a:latin typeface="Fira Sans" pitchFamily="34"/>
+              </a:rPr>
+              <a:t> the treated unit</a:t>
             </a:r>
           </a:p>
           <a:p>
@@ -8844,7 +8781,7 @@
         </p:spPr>
         <p:txBody>
           <a:bodyPr>
-            <a:normAutofit/>
+            <a:normAutofit lnSpcReduction="10000"/>
           </a:bodyPr>
           <a:lstStyle/>
           <a:p>
@@ -8909,7 +8846,7 @@
                 </a:solidFill>
                 <a:latin typeface="Fira Sans" pitchFamily="34"/>
               </a:rPr>
-              <a:t>Pre-intervention control variables</a:t>
+              <a:t>Pre-intervention covariates</a:t>
             </a:r>
           </a:p>
           <a:p>
@@ -8960,12 +8897,28 @@
               <a:t>Price of cigarettes</a:t>
             </a:r>
           </a:p>
+          <a:p>
+            <a:pPr lvl="1">
+              <a:lnSpc>
+                <a:spcPct val="100000"/>
+              </a:lnSpc>
+            </a:pPr>
+            <a:r>
+              <a:rPr lang="en-GB" sz="2800" dirty="0">
+                <a:solidFill>
+                  <a:srgbClr val="404040"/>
+                </a:solidFill>
+                <a:latin typeface="Fira Sans" pitchFamily="34"/>
+              </a:rPr>
+              <a:t>Beer consumption</a:t>
+            </a:r>
+          </a:p>
         </p:txBody>
       </p:sp>
     </p:spTree>
     <p:extLst>
       <p:ext uri="{BB962C8B-B14F-4D97-AF65-F5344CB8AC3E}">
-        <p14:creationId xmlns:p14="http://schemas.microsoft.com/office/powerpoint/2010/main" val="700492099"/>
+        <p14:creationId xmlns:p14="http://schemas.microsoft.com/office/powerpoint/2010/main" val="1048524269"/>
       </p:ext>
     </p:extLst>
   </p:cSld>
@@ -9032,236 +8985,8 @@
           </a:p>
         </p:txBody>
       </p:sp>
-      <p:sp>
-        <p:nvSpPr>
-          <p:cNvPr id="3" name="Content Placeholder 2">
-            <a:extLst>
-              <a:ext uri="{FF2B5EF4-FFF2-40B4-BE49-F238E27FC236}">
-                <a16:creationId xmlns:a16="http://schemas.microsoft.com/office/drawing/2014/main" id="{101C6031-0036-4227-9AE0-DCC63CE3973A}"/>
-              </a:ext>
-            </a:extLst>
-          </p:cNvPr>
-          <p:cNvSpPr txBox="1">
-            <a:spLocks noGrp="1"/>
-          </p:cNvSpPr>
-          <p:nvPr>
-            <p:ph idx="1"/>
-          </p:nvPr>
-        </p:nvSpPr>
-        <p:spPr>
-          <a:xfrm>
-            <a:off x="838203" y="1825627"/>
-            <a:ext cx="10515600" cy="4667243"/>
-          </a:xfrm>
-        </p:spPr>
-        <p:txBody>
-          <a:bodyPr>
-            <a:normAutofit lnSpcReduction="10000"/>
-          </a:bodyPr>
-          <a:lstStyle/>
-          <a:p>
-            <a:pPr marL="0" indent="0">
-              <a:lnSpc>
-                <a:spcPct val="100000"/>
-              </a:lnSpc>
-              <a:buNone/>
-            </a:pPr>
-            <a:r>
-              <a:rPr lang="en-GB" sz="3200" dirty="0">
-                <a:solidFill>
-                  <a:srgbClr val="404040"/>
-                </a:solidFill>
-                <a:latin typeface="Fira Sans" pitchFamily="34"/>
-              </a:rPr>
-              <a:t>What does it mean to looks like California? This is a choice by the researcher!</a:t>
-            </a:r>
-          </a:p>
-          <a:p>
-            <a:pPr>
-              <a:lnSpc>
-                <a:spcPct val="100000"/>
-              </a:lnSpc>
-            </a:pPr>
-            <a:r>
-              <a:rPr lang="en-GB" sz="3200" dirty="0">
-                <a:solidFill>
-                  <a:srgbClr val="404040"/>
-                </a:solidFill>
-                <a:latin typeface="Fira Sans" pitchFamily="34"/>
-              </a:rPr>
-              <a:t>Pre-intervention target variables</a:t>
-            </a:r>
-          </a:p>
-          <a:p>
-            <a:pPr lvl="1">
-              <a:lnSpc>
-                <a:spcPct val="100000"/>
-              </a:lnSpc>
-            </a:pPr>
-            <a:r>
-              <a:rPr lang="en-GB" sz="2800" dirty="0">
-                <a:solidFill>
-                  <a:srgbClr val="404040"/>
-                </a:solidFill>
-                <a:latin typeface="Fira Sans" pitchFamily="34"/>
-              </a:rPr>
-              <a:t>Cigarette sales</a:t>
-            </a:r>
-          </a:p>
-          <a:p>
-            <a:pPr>
-              <a:lnSpc>
-                <a:spcPct val="100000"/>
-              </a:lnSpc>
-            </a:pPr>
-            <a:r>
-              <a:rPr lang="en-GB" sz="3200" dirty="0">
-                <a:solidFill>
-                  <a:srgbClr val="404040"/>
-                </a:solidFill>
-                <a:latin typeface="Fira Sans" pitchFamily="34"/>
-              </a:rPr>
-              <a:t>Pre-intervention control variables</a:t>
-            </a:r>
-          </a:p>
-          <a:p>
-            <a:pPr lvl="1">
-              <a:lnSpc>
-                <a:spcPct val="100000"/>
-              </a:lnSpc>
-            </a:pPr>
-            <a:r>
-              <a:rPr lang="en-GB" sz="2800" dirty="0">
-                <a:solidFill>
-                  <a:srgbClr val="404040"/>
-                </a:solidFill>
-                <a:latin typeface="Fira Sans" pitchFamily="34"/>
-              </a:rPr>
-              <a:t>Population composition</a:t>
-            </a:r>
-          </a:p>
-          <a:p>
-            <a:pPr lvl="1">
-              <a:lnSpc>
-                <a:spcPct val="100000"/>
-              </a:lnSpc>
-            </a:pPr>
-            <a:r>
-              <a:rPr lang="en-GB" sz="2800" dirty="0">
-                <a:solidFill>
-                  <a:srgbClr val="404040"/>
-                </a:solidFill>
-                <a:latin typeface="Fira Sans" pitchFamily="34"/>
-              </a:rPr>
-              <a:t>Average income of population</a:t>
-            </a:r>
-          </a:p>
-          <a:p>
-            <a:pPr lvl="1">
-              <a:lnSpc>
-                <a:spcPct val="100000"/>
-              </a:lnSpc>
-            </a:pPr>
-            <a:r>
-              <a:rPr lang="en-GB" sz="2800" dirty="0">
-                <a:solidFill>
-                  <a:srgbClr val="404040"/>
-                </a:solidFill>
-                <a:latin typeface="Fira Sans" pitchFamily="34"/>
-              </a:rPr>
-              <a:t>Price of cigarettes</a:t>
-            </a:r>
-          </a:p>
-          <a:p>
-            <a:pPr lvl="1">
-              <a:lnSpc>
-                <a:spcPct val="100000"/>
-              </a:lnSpc>
-            </a:pPr>
-            <a:r>
-              <a:rPr lang="en-GB" sz="2800" dirty="0">
-                <a:solidFill>
-                  <a:srgbClr val="404040"/>
-                </a:solidFill>
-                <a:latin typeface="Fira Sans" pitchFamily="34"/>
-              </a:rPr>
-              <a:t>Beer consumption</a:t>
-            </a:r>
-          </a:p>
-        </p:txBody>
-      </p:sp>
-    </p:spTree>
-    <p:extLst>
-      <p:ext uri="{BB962C8B-B14F-4D97-AF65-F5344CB8AC3E}">
-        <p14:creationId xmlns:p14="http://schemas.microsoft.com/office/powerpoint/2010/main" val="1048524269"/>
-      </p:ext>
-    </p:extLst>
-  </p:cSld>
-  <p:clrMapOvr>
-    <a:masterClrMapping/>
-  </p:clrMapOvr>
-</p:sld>
-</file>
-
-<file path=ppt/slides/slide18.xml><?xml version="1.0" encoding="utf-8"?>
-<p:sld xmlns:a="http://schemas.openxmlformats.org/drawingml/2006/main" xmlns:r="http://schemas.openxmlformats.org/officeDocument/2006/relationships" xmlns:p="http://schemas.openxmlformats.org/presentationml/2006/main">
-  <p:cSld>
-    <p:spTree>
-      <p:nvGrpSpPr>
-        <p:cNvPr id="1" name=""/>
-        <p:cNvGrpSpPr/>
-        <p:nvPr/>
-      </p:nvGrpSpPr>
-      <p:grpSpPr>
-        <a:xfrm>
-          <a:off x="0" y="0"/>
-          <a:ext cx="0" cy="0"/>
-          <a:chOff x="0" y="0"/>
-          <a:chExt cx="0" cy="0"/>
-        </a:xfrm>
-      </p:grpSpPr>
-      <p:sp>
-        <p:nvSpPr>
-          <p:cNvPr id="2" name="Title 1">
-            <a:extLst>
-              <a:ext uri="{FF2B5EF4-FFF2-40B4-BE49-F238E27FC236}">
-                <a16:creationId xmlns:a16="http://schemas.microsoft.com/office/drawing/2014/main" id="{036EB03B-6F62-4CCD-A4CD-12EC24AAF912}"/>
-              </a:ext>
-            </a:extLst>
-          </p:cNvPr>
-          <p:cNvSpPr txBox="1">
-            <a:spLocks noGrp="1"/>
-          </p:cNvSpPr>
-          <p:nvPr>
-            <p:ph type="title"/>
-          </p:nvPr>
-        </p:nvSpPr>
-        <p:spPr/>
-        <p:txBody>
-          <a:bodyPr/>
-          <a:lstStyle/>
-          <a:p>
-            <a:pPr lvl="0">
-              <a:lnSpc>
-                <a:spcPct val="100000"/>
-              </a:lnSpc>
-            </a:pPr>
-            <a:r>
-              <a:rPr lang="en-GB" sz="5400" b="1" kern="0" dirty="0">
-                <a:solidFill>
-                  <a:srgbClr val="006388"/>
-                </a:solidFill>
-                <a:latin typeface="Fira Sans" pitchFamily="34"/>
-                <a:ea typeface="Fira Code" pitchFamily="49"/>
-              </a:rPr>
-              <a:t>Estimating weights</a:t>
-            </a:r>
-            <a:endParaRPr lang="en-GB" sz="1800" kern="0" dirty="0"/>
-          </a:p>
-        </p:txBody>
-      </p:sp>
-      <mc:AlternateContent xmlns:mc="http://schemas.openxmlformats.org/markup-compatibility/2006">
-        <mc:Choice xmlns:a14="http://schemas.microsoft.com/office/drawing/2010/main" Requires="a14">
+      <mc:AlternateContent xmlns:mc="http://schemas.openxmlformats.org/markup-compatibility/2006" xmlns:a14="http://schemas.microsoft.com/office/drawing/2010/main">
+        <mc:Choice Requires="a14">
           <p:sp>
             <p:nvSpPr>
               <p:cNvPr id="3" name="Content Placeholder 2">
@@ -9950,7 +9675,7 @@
             </p:txBody>
           </p:sp>
         </mc:Choice>
-        <mc:Fallback>
+        <mc:Fallback xmlns="">
           <p:sp>
             <p:nvSpPr>
               <p:cNvPr id="3" name="Content Placeholder 2">
@@ -10007,7 +9732,7 @@
 </p:sld>
 </file>
 
-<file path=ppt/slides/slide19.xml><?xml version="1.0" encoding="utf-8"?>
+<file path=ppt/slides/slide18.xml><?xml version="1.0" encoding="utf-8"?>
 <p:sld xmlns:a="http://schemas.openxmlformats.org/drawingml/2006/main" xmlns:r="http://schemas.openxmlformats.org/officeDocument/2006/relationships" xmlns:p="http://schemas.openxmlformats.org/presentationml/2006/main">
   <p:cSld>
     <p:spTree>
@@ -10064,8 +9789,8 @@
           </a:p>
         </p:txBody>
       </p:sp>
-      <mc:AlternateContent xmlns:mc="http://schemas.openxmlformats.org/markup-compatibility/2006">
-        <mc:Choice xmlns:a14="http://schemas.microsoft.com/office/drawing/2010/main" Requires="a14">
+      <mc:AlternateContent xmlns:mc="http://schemas.openxmlformats.org/markup-compatibility/2006" xmlns:a14="http://schemas.microsoft.com/office/drawing/2010/main">
+        <mc:Choice Requires="a14">
           <p:sp>
             <p:nvSpPr>
               <p:cNvPr id="3" name="Content Placeholder 2">
@@ -10324,7 +10049,7 @@
             </p:txBody>
           </p:sp>
         </mc:Choice>
-        <mc:Fallback>
+        <mc:Fallback xmlns="">
           <p:sp>
             <p:nvSpPr>
               <p:cNvPr id="3" name="Content Placeholder 2">
@@ -10381,194 +10106,7 @@
 </p:sld>
 </file>
 
-<file path=ppt/slides/slide2.xml><?xml version="1.0" encoding="utf-8"?>
-<p:sld xmlns:a="http://schemas.openxmlformats.org/drawingml/2006/main" xmlns:r="http://schemas.openxmlformats.org/officeDocument/2006/relationships" xmlns:p="http://schemas.openxmlformats.org/presentationml/2006/main">
-  <p:cSld>
-    <p:spTree>
-      <p:nvGrpSpPr>
-        <p:cNvPr id="1" name=""/>
-        <p:cNvGrpSpPr/>
-        <p:nvPr/>
-      </p:nvGrpSpPr>
-      <p:grpSpPr>
-        <a:xfrm>
-          <a:off x="0" y="0"/>
-          <a:ext cx="0" cy="0"/>
-          <a:chOff x="0" y="0"/>
-          <a:chExt cx="0" cy="0"/>
-        </a:xfrm>
-      </p:grpSpPr>
-      <p:sp>
-        <p:nvSpPr>
-          <p:cNvPr id="3" name="Content Placeholder 2">
-            <a:extLst>
-              <a:ext uri="{FF2B5EF4-FFF2-40B4-BE49-F238E27FC236}">
-                <a16:creationId xmlns:a16="http://schemas.microsoft.com/office/drawing/2014/main" id="{101C6031-0036-4227-9AE0-DCC63CE3973A}"/>
-              </a:ext>
-            </a:extLst>
-          </p:cNvPr>
-          <p:cNvSpPr txBox="1">
-            <a:spLocks noGrp="1"/>
-          </p:cNvSpPr>
-          <p:nvPr>
-            <p:ph idx="1"/>
-          </p:nvPr>
-        </p:nvSpPr>
-        <p:spPr>
-          <a:xfrm>
-            <a:off x="838203" y="1825627"/>
-            <a:ext cx="10515600" cy="4667243"/>
-          </a:xfrm>
-        </p:spPr>
-        <p:txBody>
-          <a:bodyPr>
-            <a:normAutofit/>
-          </a:bodyPr>
-          <a:lstStyle/>
-          <a:p>
-            <a:pPr marL="0" indent="0">
-              <a:lnSpc>
-                <a:spcPct val="100000"/>
-              </a:lnSpc>
-              <a:buNone/>
-            </a:pPr>
-            <a:r>
-              <a:rPr lang="en-US" sz="3200" i="1" dirty="0">
-                <a:solidFill>
-                  <a:srgbClr val="404040"/>
-                </a:solidFill>
-                <a:latin typeface="Fira Sans" pitchFamily="34"/>
-              </a:rPr>
-              <a:t>,,arguably the most important innovation in the policy evaluation literature in the last 15 years”</a:t>
-            </a:r>
-          </a:p>
-          <a:p>
-            <a:pPr marL="0" indent="0">
-              <a:lnSpc>
-                <a:spcPct val="100000"/>
-              </a:lnSpc>
-              <a:buNone/>
-            </a:pPr>
-            <a:endParaRPr lang="en-GB" sz="3200" dirty="0">
-              <a:solidFill>
-                <a:srgbClr val="404040"/>
-              </a:solidFill>
-              <a:latin typeface="Fira Sans" pitchFamily="34"/>
-            </a:endParaRPr>
-          </a:p>
-        </p:txBody>
-      </p:sp>
-      <p:sp>
-        <p:nvSpPr>
-          <p:cNvPr id="4" name="TextBox 3">
-            <a:extLst>
-              <a:ext uri="{FF2B5EF4-FFF2-40B4-BE49-F238E27FC236}">
-                <a16:creationId xmlns:a16="http://schemas.microsoft.com/office/drawing/2014/main" id="{1A13266D-0EE9-9E0E-BBA6-185A2BF0CD6B}"/>
-              </a:ext>
-            </a:extLst>
-          </p:cNvPr>
-          <p:cNvSpPr txBox="1"/>
-          <p:nvPr/>
-        </p:nvSpPr>
-        <p:spPr>
-          <a:xfrm>
-            <a:off x="5416547" y="2958919"/>
-            <a:ext cx="5632450" cy="1200329"/>
-          </a:xfrm>
-          <a:prstGeom prst="rect">
-            <a:avLst/>
-          </a:prstGeom>
-          <a:noFill/>
-        </p:spPr>
-        <p:txBody>
-          <a:bodyPr wrap="square">
-            <a:spAutoFit/>
-          </a:bodyPr>
-          <a:lstStyle/>
-          <a:p>
-            <a:pPr marL="0" indent="0" algn="r">
-              <a:lnSpc>
-                <a:spcPct val="100000"/>
-              </a:lnSpc>
-              <a:buNone/>
-            </a:pPr>
-            <a:endParaRPr lang="en-GB" dirty="0">
-              <a:solidFill>
-                <a:schemeClr val="bg2">
-                  <a:lumMod val="75000"/>
-                </a:schemeClr>
-              </a:solidFill>
-              <a:latin typeface="Fira Sans" pitchFamily="34"/>
-            </a:endParaRPr>
-          </a:p>
-          <a:p>
-            <a:pPr marL="0" indent="0" algn="r">
-              <a:lnSpc>
-                <a:spcPct val="100000"/>
-              </a:lnSpc>
-              <a:buNone/>
-            </a:pPr>
-            <a:r>
-              <a:rPr lang="en-US" i="1" dirty="0" err="1">
-                <a:solidFill>
-                  <a:schemeClr val="bg2">
-                    <a:lumMod val="75000"/>
-                  </a:schemeClr>
-                </a:solidFill>
-                <a:latin typeface="Fira Sans" pitchFamily="34"/>
-              </a:rPr>
-              <a:t>Athey</a:t>
-            </a:r>
-            <a:r>
-              <a:rPr lang="en-US" i="1" dirty="0">
-                <a:solidFill>
-                  <a:schemeClr val="bg2">
-                    <a:lumMod val="75000"/>
-                  </a:schemeClr>
-                </a:solidFill>
-                <a:latin typeface="Fira Sans" pitchFamily="34"/>
-              </a:rPr>
-              <a:t>, S., &amp; </a:t>
-            </a:r>
-            <a:r>
-              <a:rPr lang="en-US" i="1" dirty="0" err="1">
-                <a:solidFill>
-                  <a:schemeClr val="bg2">
-                    <a:lumMod val="75000"/>
-                  </a:schemeClr>
-                </a:solidFill>
-                <a:latin typeface="Fira Sans" pitchFamily="34"/>
-              </a:rPr>
-              <a:t>Imbens</a:t>
-            </a:r>
-            <a:r>
-              <a:rPr lang="en-US" i="1" dirty="0">
-                <a:solidFill>
-                  <a:schemeClr val="bg2">
-                    <a:lumMod val="75000"/>
-                  </a:schemeClr>
-                </a:solidFill>
-                <a:latin typeface="Fira Sans" pitchFamily="34"/>
-              </a:rPr>
-              <a:t>, G. W. (2017). The state of applied econometrics: Causality and policy evaluation. Journal of Economic perspectives, 31(2), 3-32.</a:t>
-            </a:r>
-          </a:p>
-        </p:txBody>
-      </p:sp>
-    </p:spTree>
-    <p:extLst>
-      <p:ext uri="{BB962C8B-B14F-4D97-AF65-F5344CB8AC3E}">
-        <p14:creationId xmlns:p14="http://schemas.microsoft.com/office/powerpoint/2010/main" val="3711603300"/>
-      </p:ext>
-    </p:extLst>
-  </p:cSld>
-  <p:clrMapOvr>
-    <a:masterClrMapping/>
-  </p:clrMapOvr>
-</p:sld>
-</file>
-
-<file path=ppt/slides/slide20.xml><?xml version="1.0" encoding="utf-8"?>
+<file path=ppt/slides/slide19.xml><?xml version="1.0" encoding="utf-8"?>
 <p:sld xmlns:a="http://schemas.openxmlformats.org/drawingml/2006/main" xmlns:r="http://schemas.openxmlformats.org/officeDocument/2006/relationships" xmlns:p="http://schemas.openxmlformats.org/presentationml/2006/main">
   <p:cSld>
     <p:bg>
@@ -10646,6 +10184,388 @@
     <p:extLst>
       <p:ext uri="{BB962C8B-B14F-4D97-AF65-F5344CB8AC3E}">
         <p14:creationId xmlns:p14="http://schemas.microsoft.com/office/powerpoint/2010/main" val="1928620155"/>
+      </p:ext>
+    </p:extLst>
+  </p:cSld>
+  <p:clrMapOvr>
+    <a:masterClrMapping/>
+  </p:clrMapOvr>
+</p:sld>
+</file>
+
+<file path=ppt/slides/slide2.xml><?xml version="1.0" encoding="utf-8"?>
+<p:sld xmlns:a="http://schemas.openxmlformats.org/drawingml/2006/main" xmlns:r="http://schemas.openxmlformats.org/officeDocument/2006/relationships" xmlns:p="http://schemas.openxmlformats.org/presentationml/2006/main">
+  <p:cSld>
+    <p:spTree>
+      <p:nvGrpSpPr>
+        <p:cNvPr id="1" name=""/>
+        <p:cNvGrpSpPr/>
+        <p:nvPr/>
+      </p:nvGrpSpPr>
+      <p:grpSpPr>
+        <a:xfrm>
+          <a:off x="0" y="0"/>
+          <a:ext cx="0" cy="0"/>
+          <a:chOff x="0" y="0"/>
+          <a:chExt cx="0" cy="0"/>
+        </a:xfrm>
+      </p:grpSpPr>
+      <p:sp>
+        <p:nvSpPr>
+          <p:cNvPr id="3" name="Content Placeholder 2">
+            <a:extLst>
+              <a:ext uri="{FF2B5EF4-FFF2-40B4-BE49-F238E27FC236}">
+                <a16:creationId xmlns:a16="http://schemas.microsoft.com/office/drawing/2014/main" id="{101C6031-0036-4227-9AE0-DCC63CE3973A}"/>
+              </a:ext>
+            </a:extLst>
+          </p:cNvPr>
+          <p:cNvSpPr txBox="1">
+            <a:spLocks noGrp="1"/>
+          </p:cNvSpPr>
+          <p:nvPr>
+            <p:ph idx="1"/>
+          </p:nvPr>
+        </p:nvSpPr>
+        <p:spPr>
+          <a:xfrm>
+            <a:off x="838203" y="1825627"/>
+            <a:ext cx="10515600" cy="4667243"/>
+          </a:xfrm>
+        </p:spPr>
+        <p:txBody>
+          <a:bodyPr>
+            <a:normAutofit/>
+          </a:bodyPr>
+          <a:lstStyle/>
+          <a:p>
+            <a:pPr marL="0" indent="0">
+              <a:lnSpc>
+                <a:spcPct val="100000"/>
+              </a:lnSpc>
+              <a:buNone/>
+            </a:pPr>
+            <a:r>
+              <a:rPr lang="en-US" sz="3200" i="1" dirty="0">
+                <a:solidFill>
+                  <a:srgbClr val="404040"/>
+                </a:solidFill>
+                <a:latin typeface="Fira Sans" pitchFamily="34"/>
+              </a:rPr>
+              <a:t>,,arguably the most important innovation in the policy evaluation literature in the last 15 years”</a:t>
+            </a:r>
+          </a:p>
+          <a:p>
+            <a:pPr marL="0" indent="0">
+              <a:lnSpc>
+                <a:spcPct val="100000"/>
+              </a:lnSpc>
+              <a:buNone/>
+            </a:pPr>
+            <a:endParaRPr lang="en-GB" sz="3200" dirty="0">
+              <a:solidFill>
+                <a:srgbClr val="404040"/>
+              </a:solidFill>
+              <a:latin typeface="Fira Sans" pitchFamily="34"/>
+            </a:endParaRPr>
+          </a:p>
+        </p:txBody>
+      </p:sp>
+      <p:sp>
+        <p:nvSpPr>
+          <p:cNvPr id="4" name="TextBox 3">
+            <a:extLst>
+              <a:ext uri="{FF2B5EF4-FFF2-40B4-BE49-F238E27FC236}">
+                <a16:creationId xmlns:a16="http://schemas.microsoft.com/office/drawing/2014/main" id="{1A13266D-0EE9-9E0E-BBA6-185A2BF0CD6B}"/>
+              </a:ext>
+            </a:extLst>
+          </p:cNvPr>
+          <p:cNvSpPr txBox="1"/>
+          <p:nvPr/>
+        </p:nvSpPr>
+        <p:spPr>
+          <a:xfrm>
+            <a:off x="5416547" y="2958919"/>
+            <a:ext cx="5632450" cy="1200329"/>
+          </a:xfrm>
+          <a:prstGeom prst="rect">
+            <a:avLst/>
+          </a:prstGeom>
+          <a:noFill/>
+        </p:spPr>
+        <p:txBody>
+          <a:bodyPr wrap="square">
+            <a:spAutoFit/>
+          </a:bodyPr>
+          <a:lstStyle/>
+          <a:p>
+            <a:pPr marL="0" indent="0" algn="r">
+              <a:lnSpc>
+                <a:spcPct val="100000"/>
+              </a:lnSpc>
+              <a:buNone/>
+            </a:pPr>
+            <a:endParaRPr lang="en-GB" dirty="0">
+              <a:solidFill>
+                <a:schemeClr val="bg2">
+                  <a:lumMod val="75000"/>
+                </a:schemeClr>
+              </a:solidFill>
+              <a:latin typeface="Fira Sans" pitchFamily="34"/>
+            </a:endParaRPr>
+          </a:p>
+          <a:p>
+            <a:pPr marL="0" indent="0" algn="r">
+              <a:lnSpc>
+                <a:spcPct val="100000"/>
+              </a:lnSpc>
+              <a:buNone/>
+            </a:pPr>
+            <a:r>
+              <a:rPr lang="en-US" i="1" dirty="0" err="1">
+                <a:solidFill>
+                  <a:schemeClr val="bg2">
+                    <a:lumMod val="75000"/>
+                  </a:schemeClr>
+                </a:solidFill>
+                <a:latin typeface="Fira Sans" pitchFamily="34"/>
+              </a:rPr>
+              <a:t>Athey</a:t>
+            </a:r>
+            <a:r>
+              <a:rPr lang="en-US" i="1" dirty="0">
+                <a:solidFill>
+                  <a:schemeClr val="bg2">
+                    <a:lumMod val="75000"/>
+                  </a:schemeClr>
+                </a:solidFill>
+                <a:latin typeface="Fira Sans" pitchFamily="34"/>
+              </a:rPr>
+              <a:t>, S., &amp; </a:t>
+            </a:r>
+            <a:r>
+              <a:rPr lang="en-US" i="1" dirty="0" err="1">
+                <a:solidFill>
+                  <a:schemeClr val="bg2">
+                    <a:lumMod val="75000"/>
+                  </a:schemeClr>
+                </a:solidFill>
+                <a:latin typeface="Fira Sans" pitchFamily="34"/>
+              </a:rPr>
+              <a:t>Imbens</a:t>
+            </a:r>
+            <a:r>
+              <a:rPr lang="en-US" i="1" dirty="0">
+                <a:solidFill>
+                  <a:schemeClr val="bg2">
+                    <a:lumMod val="75000"/>
+                  </a:schemeClr>
+                </a:solidFill>
+                <a:latin typeface="Fira Sans" pitchFamily="34"/>
+              </a:rPr>
+              <a:t>, G. W. (2017). The state of applied econometrics: Causality and policy evaluation. Journal of Economic perspectives, 31(2), 3-32.</a:t>
+            </a:r>
+          </a:p>
+        </p:txBody>
+      </p:sp>
+    </p:spTree>
+    <p:extLst>
+      <p:ext uri="{BB962C8B-B14F-4D97-AF65-F5344CB8AC3E}">
+        <p14:creationId xmlns:p14="http://schemas.microsoft.com/office/powerpoint/2010/main" val="3711603300"/>
+      </p:ext>
+    </p:extLst>
+  </p:cSld>
+  <p:clrMapOvr>
+    <a:masterClrMapping/>
+  </p:clrMapOvr>
+</p:sld>
+</file>
+
+<file path=ppt/slides/slide20.xml><?xml version="1.0" encoding="utf-8"?>
+<p:sld xmlns:a="http://schemas.openxmlformats.org/drawingml/2006/main" xmlns:r="http://schemas.openxmlformats.org/officeDocument/2006/relationships" xmlns:p="http://schemas.openxmlformats.org/presentationml/2006/main">
+  <p:cSld>
+    <p:spTree>
+      <p:nvGrpSpPr>
+        <p:cNvPr id="1" name=""/>
+        <p:cNvGrpSpPr/>
+        <p:nvPr/>
+      </p:nvGrpSpPr>
+      <p:grpSpPr>
+        <a:xfrm>
+          <a:off x="0" y="0"/>
+          <a:ext cx="0" cy="0"/>
+          <a:chOff x="0" y="0"/>
+          <a:chExt cx="0" cy="0"/>
+        </a:xfrm>
+      </p:grpSpPr>
+      <p:sp>
+        <p:nvSpPr>
+          <p:cNvPr id="2" name="Title 1">
+            <a:extLst>
+              <a:ext uri="{FF2B5EF4-FFF2-40B4-BE49-F238E27FC236}">
+                <a16:creationId xmlns:a16="http://schemas.microsoft.com/office/drawing/2014/main" id="{036EB03B-6F62-4CCD-A4CD-12EC24AAF912}"/>
+              </a:ext>
+            </a:extLst>
+          </p:cNvPr>
+          <p:cNvSpPr txBox="1">
+            <a:spLocks noGrp="1"/>
+          </p:cNvSpPr>
+          <p:nvPr>
+            <p:ph type="title"/>
+          </p:nvPr>
+        </p:nvSpPr>
+        <p:spPr/>
+        <p:txBody>
+          <a:bodyPr/>
+          <a:lstStyle/>
+          <a:p>
+            <a:pPr lvl="0">
+              <a:lnSpc>
+                <a:spcPct val="100000"/>
+              </a:lnSpc>
+            </a:pPr>
+            <a:r>
+              <a:rPr lang="en-GB" sz="5400" b="1" kern="0" dirty="0">
+                <a:solidFill>
+                  <a:srgbClr val="006388"/>
+                </a:solidFill>
+                <a:latin typeface="Fira Sans" pitchFamily="34"/>
+                <a:ea typeface="Fira Code" pitchFamily="49"/>
+              </a:rPr>
+              <a:t>No interference / </a:t>
+            </a:r>
+            <a:r>
+              <a:rPr lang="en-GB" sz="5400" b="1" kern="0" dirty="0" err="1">
+                <a:solidFill>
+                  <a:srgbClr val="006388"/>
+                </a:solidFill>
+                <a:latin typeface="Fira Sans" pitchFamily="34"/>
+                <a:ea typeface="Fira Code" pitchFamily="49"/>
+              </a:rPr>
+              <a:t>spillover</a:t>
+            </a:r>
+            <a:endParaRPr lang="en-GB" sz="5400" b="1" kern="0" dirty="0">
+              <a:solidFill>
+                <a:srgbClr val="006388"/>
+              </a:solidFill>
+              <a:latin typeface="Fira Sans" pitchFamily="34"/>
+              <a:ea typeface="Fira Code" pitchFamily="49"/>
+            </a:endParaRPr>
+          </a:p>
+        </p:txBody>
+      </p:sp>
+      <p:sp>
+        <p:nvSpPr>
+          <p:cNvPr id="3" name="Content Placeholder 2">
+            <a:extLst>
+              <a:ext uri="{FF2B5EF4-FFF2-40B4-BE49-F238E27FC236}">
+                <a16:creationId xmlns:a16="http://schemas.microsoft.com/office/drawing/2014/main" id="{101C6031-0036-4227-9AE0-DCC63CE3973A}"/>
+              </a:ext>
+            </a:extLst>
+          </p:cNvPr>
+          <p:cNvSpPr txBox="1">
+            <a:spLocks noGrp="1"/>
+          </p:cNvSpPr>
+          <p:nvPr>
+            <p:ph idx="1"/>
+          </p:nvPr>
+        </p:nvSpPr>
+        <p:spPr>
+          <a:xfrm>
+            <a:off x="838203" y="1825627"/>
+            <a:ext cx="10515600" cy="4667243"/>
+          </a:xfrm>
+        </p:spPr>
+        <p:txBody>
+          <a:bodyPr>
+            <a:normAutofit/>
+          </a:bodyPr>
+          <a:lstStyle/>
+          <a:p>
+            <a:pPr marL="0" indent="0">
+              <a:lnSpc>
+                <a:spcPct val="100000"/>
+              </a:lnSpc>
+              <a:buNone/>
+            </a:pPr>
+            <a:r>
+              <a:rPr lang="en-US" sz="3200" b="1" dirty="0">
+                <a:solidFill>
+                  <a:srgbClr val="404040"/>
+                </a:solidFill>
+                <a:latin typeface="Fira Sans" pitchFamily="34"/>
+              </a:rPr>
+              <a:t>The donor pool unit does not receive any intervention effect</a:t>
+            </a:r>
+          </a:p>
+          <a:p>
+            <a:pPr marL="0" indent="0">
+              <a:lnSpc>
+                <a:spcPct val="100000"/>
+              </a:lnSpc>
+              <a:buNone/>
+            </a:pPr>
+            <a:endParaRPr lang="en-US" sz="3200" dirty="0">
+              <a:solidFill>
+                <a:srgbClr val="404040"/>
+              </a:solidFill>
+              <a:latin typeface="Fira Sans" pitchFamily="34"/>
+            </a:endParaRPr>
+          </a:p>
+          <a:p>
+            <a:pPr marL="0" indent="0">
+              <a:lnSpc>
+                <a:spcPct val="100000"/>
+              </a:lnSpc>
+              <a:buNone/>
+            </a:pPr>
+            <a:r>
+              <a:rPr lang="en-US" sz="3200" dirty="0">
+                <a:solidFill>
+                  <a:srgbClr val="404040"/>
+                </a:solidFill>
+                <a:latin typeface="Fira Sans" pitchFamily="34"/>
+              </a:rPr>
+              <a:t>Example spillover effects</a:t>
+            </a:r>
+          </a:p>
+          <a:p>
+            <a:pPr>
+              <a:lnSpc>
+                <a:spcPct val="100000"/>
+              </a:lnSpc>
+            </a:pPr>
+            <a:r>
+              <a:rPr lang="en-US" sz="3200" dirty="0">
+                <a:solidFill>
+                  <a:srgbClr val="404040"/>
+                </a:solidFill>
+                <a:latin typeface="Fira Sans" pitchFamily="34"/>
+              </a:rPr>
+              <a:t>Californians living near the border may buy their cigarettes in states across the border</a:t>
+            </a:r>
+          </a:p>
+          <a:p>
+            <a:pPr>
+              <a:lnSpc>
+                <a:spcPct val="100000"/>
+              </a:lnSpc>
+            </a:pPr>
+            <a:r>
+              <a:rPr lang="en-US" sz="3200" dirty="0">
+                <a:solidFill>
+                  <a:srgbClr val="404040"/>
+                </a:solidFill>
+                <a:latin typeface="Fira Sans" pitchFamily="34"/>
+              </a:rPr>
+              <a:t>Other states may pass laws similar to on California</a:t>
+            </a:r>
+          </a:p>
+        </p:txBody>
+      </p:sp>
+    </p:spTree>
+    <p:extLst>
+      <p:ext uri="{BB962C8B-B14F-4D97-AF65-F5344CB8AC3E}">
+        <p14:creationId xmlns:p14="http://schemas.microsoft.com/office/powerpoint/2010/main" val="3108774746"/>
       </p:ext>
     </p:extLst>
   </p:cSld>
@@ -10706,25 +10626,8 @@
                 <a:latin typeface="Fira Sans" pitchFamily="34"/>
                 <a:ea typeface="Fira Code" pitchFamily="49"/>
               </a:rPr>
-              <a:t>No interference / </a:t>
-            </a:r>
-            <a:r>
-              <a:rPr lang="en-GB" sz="5400" b="1" kern="0" dirty="0" err="1">
-                <a:solidFill>
-                  <a:srgbClr val="006388"/>
-                </a:solidFill>
-                <a:latin typeface="Fira Sans" pitchFamily="34"/>
-                <a:ea typeface="Fira Code" pitchFamily="49"/>
-              </a:rPr>
-              <a:t>spillover</a:t>
-            </a:r>
-            <a:endParaRPr lang="en-GB" sz="5400" b="1" kern="0" dirty="0">
-              <a:solidFill>
-                <a:srgbClr val="006388"/>
-              </a:solidFill>
-              <a:latin typeface="Fira Sans" pitchFamily="34"/>
-              <a:ea typeface="Fira Code" pitchFamily="49"/>
-            </a:endParaRPr>
+              <a:t>Measurement</a:t>
+            </a:r>
           </a:p>
         </p:txBody>
       </p:sp>
@@ -10763,13 +10666,31 @@
               <a:buNone/>
             </a:pPr>
             <a:r>
+              <a:rPr lang="en-US" sz="3200" dirty="0">
+                <a:solidFill>
+                  <a:srgbClr val="404040"/>
+                </a:solidFill>
+                <a:latin typeface="Fira Sans" pitchFamily="34"/>
+              </a:rPr>
+              <a:t>Measure control variables and target variable in the donor pool unit </a:t>
+            </a:r>
+            <a:r>
               <a:rPr lang="en-US" sz="3200" b="1" dirty="0">
                 <a:solidFill>
                   <a:srgbClr val="404040"/>
                 </a:solidFill>
                 <a:latin typeface="Fira Sans" pitchFamily="34"/>
               </a:rPr>
-              <a:t>The donor pool unit does not receive any intervention effect</a:t>
+              <a:t>before and after </a:t>
+            </a:r>
+            <a:r>
+              <a:rPr lang="en-US" sz="3200" dirty="0">
+                <a:solidFill>
+                  <a:srgbClr val="404040"/>
+                </a:solidFill>
+                <a:latin typeface="Fira Sans" pitchFamily="34"/>
+              </a:rPr>
+              <a:t>the intervention</a:t>
             </a:r>
           </a:p>
           <a:p>
@@ -10787,60 +10708,97 @@
             </a:endParaRPr>
           </a:p>
           <a:p>
+            <a:pPr>
+              <a:lnSpc>
+                <a:spcPct val="100000"/>
+              </a:lnSpc>
+            </a:pPr>
+            <a:r>
+              <a:rPr lang="en-US" sz="3200" dirty="0">
+                <a:solidFill>
+                  <a:srgbClr val="404040"/>
+                </a:solidFill>
+                <a:latin typeface="Fira Sans" pitchFamily="34"/>
+              </a:rPr>
+              <a:t>Ideally, large pre-intervention time window</a:t>
+            </a:r>
+            <a:br>
+              <a:rPr lang="en-US" sz="3200" dirty="0">
+                <a:solidFill>
+                  <a:srgbClr val="404040"/>
+                </a:solidFill>
+                <a:latin typeface="Fira Sans" pitchFamily="34"/>
+              </a:rPr>
+            </a:br>
+            <a:r>
+              <a:rPr lang="en-US" sz="3200" dirty="0">
+                <a:solidFill>
+                  <a:schemeClr val="tx1">
+                    <a:lumMod val="50000"/>
+                    <a:lumOff val="50000"/>
+                  </a:schemeClr>
+                </a:solidFill>
+                <a:latin typeface="Fira Sans" pitchFamily="34"/>
+              </a:rPr>
+              <a:t>Otherwise, risk overfitting pre-intervention; bad prediction for counterfactual</a:t>
+            </a:r>
+          </a:p>
+          <a:p>
+            <a:pPr>
+              <a:lnSpc>
+                <a:spcPct val="100000"/>
+              </a:lnSpc>
+            </a:pPr>
+            <a:r>
+              <a:rPr lang="en-US" sz="3200" dirty="0">
+                <a:solidFill>
+                  <a:srgbClr val="404040"/>
+                </a:solidFill>
+                <a:latin typeface="Fira Sans" pitchFamily="34"/>
+              </a:rPr>
+              <a:t>Be able to measure target variable after intervention</a:t>
+            </a:r>
+            <a:br>
+              <a:rPr lang="en-US" sz="3200" dirty="0">
+                <a:solidFill>
+                  <a:srgbClr val="404040"/>
+                </a:solidFill>
+                <a:latin typeface="Fira Sans" pitchFamily="34"/>
+              </a:rPr>
+            </a:br>
+            <a:r>
+              <a:rPr lang="en-US" sz="3200" dirty="0">
+                <a:solidFill>
+                  <a:schemeClr val="tx1">
+                    <a:lumMod val="50000"/>
+                    <a:lumOff val="50000"/>
+                  </a:schemeClr>
+                </a:solidFill>
+                <a:latin typeface="Fira Sans" pitchFamily="34"/>
+              </a:rPr>
+              <a:t>counterfactual is weighted average of this</a:t>
+            </a:r>
+          </a:p>
+          <a:p>
             <a:pPr marL="0" indent="0">
               <a:lnSpc>
                 <a:spcPct val="100000"/>
               </a:lnSpc>
               <a:buNone/>
             </a:pPr>
-            <a:r>
-              <a:rPr lang="en-US" sz="3200" dirty="0">
-                <a:solidFill>
-                  <a:srgbClr val="404040"/>
-                </a:solidFill>
-                <a:latin typeface="Fira Sans" pitchFamily="34"/>
-              </a:rPr>
-              <a:t>Example spillover effects</a:t>
-            </a:r>
-          </a:p>
-          <a:p>
-            <a:pPr>
-              <a:lnSpc>
-                <a:spcPct val="100000"/>
-              </a:lnSpc>
-            </a:pPr>
-            <a:r>
-              <a:rPr lang="en-US" sz="3200" dirty="0">
-                <a:solidFill>
-                  <a:srgbClr val="404040"/>
-                </a:solidFill>
-                <a:latin typeface="Fira Sans" pitchFamily="34"/>
-              </a:rPr>
-              <a:t>Californians living near the border may buy their cigarettes in states across the border</a:t>
-            </a:r>
-          </a:p>
-          <a:p>
-            <a:pPr>
-              <a:lnSpc>
-                <a:spcPct val="100000"/>
-              </a:lnSpc>
-            </a:pPr>
-            <a:r>
-              <a:rPr lang="en-US" sz="3200" dirty="0">
-                <a:solidFill>
-                  <a:srgbClr val="404040"/>
-                </a:solidFill>
-                <a:latin typeface="Fira Sans" pitchFamily="34"/>
-              </a:rPr>
-              <a:t>Other states may pass laws similar to on California</a:t>
-            </a:r>
+            <a:endParaRPr lang="en-US" sz="3200" dirty="0">
+              <a:solidFill>
+                <a:srgbClr val="404040"/>
+              </a:solidFill>
+              <a:latin typeface="Fira Sans" pitchFamily="34"/>
+            </a:endParaRPr>
           </a:p>
         </p:txBody>
       </p:sp>
     </p:spTree>
     <p:extLst>
       <p:ext uri="{BB962C8B-B14F-4D97-AF65-F5344CB8AC3E}">
-        <p14:creationId xmlns:p14="http://schemas.microsoft.com/office/powerpoint/2010/main" val="3108774746"/>
+        <p14:creationId xmlns:p14="http://schemas.microsoft.com/office/powerpoint/2010/main" val="3123224058"/>
       </p:ext>
     </p:extLst>
   </p:cSld>
@@ -10901,239 +10859,6 @@
                 <a:latin typeface="Fira Sans" pitchFamily="34"/>
                 <a:ea typeface="Fira Code" pitchFamily="49"/>
               </a:rPr>
-              <a:t>Measurement</a:t>
-            </a:r>
-          </a:p>
-        </p:txBody>
-      </p:sp>
-      <p:sp>
-        <p:nvSpPr>
-          <p:cNvPr id="3" name="Content Placeholder 2">
-            <a:extLst>
-              <a:ext uri="{FF2B5EF4-FFF2-40B4-BE49-F238E27FC236}">
-                <a16:creationId xmlns:a16="http://schemas.microsoft.com/office/drawing/2014/main" id="{101C6031-0036-4227-9AE0-DCC63CE3973A}"/>
-              </a:ext>
-            </a:extLst>
-          </p:cNvPr>
-          <p:cNvSpPr txBox="1">
-            <a:spLocks noGrp="1"/>
-          </p:cNvSpPr>
-          <p:nvPr>
-            <p:ph idx="1"/>
-          </p:nvPr>
-        </p:nvSpPr>
-        <p:spPr>
-          <a:xfrm>
-            <a:off x="838203" y="1825627"/>
-            <a:ext cx="10515600" cy="4667243"/>
-          </a:xfrm>
-        </p:spPr>
-        <p:txBody>
-          <a:bodyPr>
-            <a:normAutofit/>
-          </a:bodyPr>
-          <a:lstStyle/>
-          <a:p>
-            <a:pPr marL="0" indent="0">
-              <a:lnSpc>
-                <a:spcPct val="100000"/>
-              </a:lnSpc>
-              <a:buNone/>
-            </a:pPr>
-            <a:r>
-              <a:rPr lang="en-US" sz="3200" dirty="0">
-                <a:solidFill>
-                  <a:srgbClr val="404040"/>
-                </a:solidFill>
-                <a:latin typeface="Fira Sans" pitchFamily="34"/>
-              </a:rPr>
-              <a:t>Measure control variables and target variable in the donor pool unit </a:t>
-            </a:r>
-            <a:r>
-              <a:rPr lang="en-US" sz="3200" b="1" dirty="0">
-                <a:solidFill>
-                  <a:srgbClr val="404040"/>
-                </a:solidFill>
-                <a:latin typeface="Fira Sans" pitchFamily="34"/>
-              </a:rPr>
-              <a:t>before and after </a:t>
-            </a:r>
-            <a:r>
-              <a:rPr lang="en-US" sz="3200" dirty="0">
-                <a:solidFill>
-                  <a:srgbClr val="404040"/>
-                </a:solidFill>
-                <a:latin typeface="Fira Sans" pitchFamily="34"/>
-              </a:rPr>
-              <a:t>the intervention</a:t>
-            </a:r>
-          </a:p>
-          <a:p>
-            <a:pPr marL="0" indent="0">
-              <a:lnSpc>
-                <a:spcPct val="100000"/>
-              </a:lnSpc>
-              <a:buNone/>
-            </a:pPr>
-            <a:endParaRPr lang="en-US" sz="3200" dirty="0">
-              <a:solidFill>
-                <a:srgbClr val="404040"/>
-              </a:solidFill>
-              <a:latin typeface="Fira Sans" pitchFamily="34"/>
-            </a:endParaRPr>
-          </a:p>
-          <a:p>
-            <a:pPr>
-              <a:lnSpc>
-                <a:spcPct val="100000"/>
-              </a:lnSpc>
-            </a:pPr>
-            <a:r>
-              <a:rPr lang="en-US" sz="3200" dirty="0">
-                <a:solidFill>
-                  <a:srgbClr val="404040"/>
-                </a:solidFill>
-                <a:latin typeface="Fira Sans" pitchFamily="34"/>
-              </a:rPr>
-              <a:t>Ideally, large pre-intervention time window</a:t>
-            </a:r>
-            <a:br>
-              <a:rPr lang="en-US" sz="3200" dirty="0">
-                <a:solidFill>
-                  <a:srgbClr val="404040"/>
-                </a:solidFill>
-                <a:latin typeface="Fira Sans" pitchFamily="34"/>
-              </a:rPr>
-            </a:br>
-            <a:r>
-              <a:rPr lang="en-US" sz="3200" dirty="0">
-                <a:solidFill>
-                  <a:schemeClr val="tx1">
-                    <a:lumMod val="50000"/>
-                    <a:lumOff val="50000"/>
-                  </a:schemeClr>
-                </a:solidFill>
-                <a:latin typeface="Fira Sans" pitchFamily="34"/>
-              </a:rPr>
-              <a:t>Otherwise, risk overfitting pre-intervention; bad prediction for counterfactual</a:t>
-            </a:r>
-          </a:p>
-          <a:p>
-            <a:pPr>
-              <a:lnSpc>
-                <a:spcPct val="100000"/>
-              </a:lnSpc>
-            </a:pPr>
-            <a:r>
-              <a:rPr lang="en-US" sz="3200" dirty="0">
-                <a:solidFill>
-                  <a:srgbClr val="404040"/>
-                </a:solidFill>
-                <a:latin typeface="Fira Sans" pitchFamily="34"/>
-              </a:rPr>
-              <a:t>Be able to measure target variable after intervention</a:t>
-            </a:r>
-            <a:br>
-              <a:rPr lang="en-US" sz="3200" dirty="0">
-                <a:solidFill>
-                  <a:srgbClr val="404040"/>
-                </a:solidFill>
-                <a:latin typeface="Fira Sans" pitchFamily="34"/>
-              </a:rPr>
-            </a:br>
-            <a:r>
-              <a:rPr lang="en-US" sz="3200" dirty="0">
-                <a:solidFill>
-                  <a:schemeClr val="tx1">
-                    <a:lumMod val="50000"/>
-                    <a:lumOff val="50000"/>
-                  </a:schemeClr>
-                </a:solidFill>
-                <a:latin typeface="Fira Sans" pitchFamily="34"/>
-              </a:rPr>
-              <a:t>counterfactual is weighted average of this</a:t>
-            </a:r>
-          </a:p>
-          <a:p>
-            <a:pPr marL="0" indent="0">
-              <a:lnSpc>
-                <a:spcPct val="100000"/>
-              </a:lnSpc>
-              <a:buNone/>
-            </a:pPr>
-            <a:endParaRPr lang="en-US" sz="3200" dirty="0">
-              <a:solidFill>
-                <a:srgbClr val="404040"/>
-              </a:solidFill>
-              <a:latin typeface="Fira Sans" pitchFamily="34"/>
-            </a:endParaRPr>
-          </a:p>
-        </p:txBody>
-      </p:sp>
-    </p:spTree>
-    <p:extLst>
-      <p:ext uri="{BB962C8B-B14F-4D97-AF65-F5344CB8AC3E}">
-        <p14:creationId xmlns:p14="http://schemas.microsoft.com/office/powerpoint/2010/main" val="3123224058"/>
-      </p:ext>
-    </p:extLst>
-  </p:cSld>
-  <p:clrMapOvr>
-    <a:masterClrMapping/>
-  </p:clrMapOvr>
-</p:sld>
-</file>
-
-<file path=ppt/slides/slide23.xml><?xml version="1.0" encoding="utf-8"?>
-<p:sld xmlns:a="http://schemas.openxmlformats.org/drawingml/2006/main" xmlns:r="http://schemas.openxmlformats.org/officeDocument/2006/relationships" xmlns:p="http://schemas.openxmlformats.org/presentationml/2006/main">
-  <p:cSld>
-    <p:spTree>
-      <p:nvGrpSpPr>
-        <p:cNvPr id="1" name=""/>
-        <p:cNvGrpSpPr/>
-        <p:nvPr/>
-      </p:nvGrpSpPr>
-      <p:grpSpPr>
-        <a:xfrm>
-          <a:off x="0" y="0"/>
-          <a:ext cx="0" cy="0"/>
-          <a:chOff x="0" y="0"/>
-          <a:chExt cx="0" cy="0"/>
-        </a:xfrm>
-      </p:grpSpPr>
-      <p:sp>
-        <p:nvSpPr>
-          <p:cNvPr id="2" name="Title 1">
-            <a:extLst>
-              <a:ext uri="{FF2B5EF4-FFF2-40B4-BE49-F238E27FC236}">
-                <a16:creationId xmlns:a16="http://schemas.microsoft.com/office/drawing/2014/main" id="{036EB03B-6F62-4CCD-A4CD-12EC24AAF912}"/>
-              </a:ext>
-            </a:extLst>
-          </p:cNvPr>
-          <p:cNvSpPr txBox="1">
-            <a:spLocks noGrp="1"/>
-          </p:cNvSpPr>
-          <p:nvPr>
-            <p:ph type="title"/>
-          </p:nvPr>
-        </p:nvSpPr>
-        <p:spPr/>
-        <p:txBody>
-          <a:bodyPr/>
-          <a:lstStyle/>
-          <a:p>
-            <a:pPr lvl="0">
-              <a:lnSpc>
-                <a:spcPct val="100000"/>
-              </a:lnSpc>
-            </a:pPr>
-            <a:r>
-              <a:rPr lang="en-GB" sz="5400" b="1" kern="0" dirty="0">
-                <a:solidFill>
-                  <a:srgbClr val="006388"/>
-                </a:solidFill>
-                <a:latin typeface="Fira Sans" pitchFamily="34"/>
-                <a:ea typeface="Fira Code" pitchFamily="49"/>
-              </a:rPr>
               <a:t>Convex </a:t>
             </a:r>
             <a:r>
@@ -11253,7 +10978,7 @@
 </p:sld>
 </file>
 
-<file path=ppt/slides/slide24.xml><?xml version="1.0" encoding="utf-8"?>
+<file path=ppt/slides/slide23.xml><?xml version="1.0" encoding="utf-8"?>
 <p:sld xmlns:a="http://schemas.openxmlformats.org/drawingml/2006/main" xmlns:r="http://schemas.openxmlformats.org/officeDocument/2006/relationships" xmlns:p="http://schemas.openxmlformats.org/presentationml/2006/main">
   <p:cSld>
     <p:bg>
@@ -11340,7 +11065,7 @@
 </p:sld>
 </file>
 
-<file path=ppt/slides/slide25.xml><?xml version="1.0" encoding="utf-8"?>
+<file path=ppt/slides/slide24.xml><?xml version="1.0" encoding="utf-8"?>
 <p:sld xmlns:a="http://schemas.openxmlformats.org/drawingml/2006/main" xmlns:r="http://schemas.openxmlformats.org/officeDocument/2006/relationships" xmlns:p="http://schemas.openxmlformats.org/presentationml/2006/main">
   <p:cSld>
     <p:spTree>
@@ -11519,7 +11244,7 @@
 </p:sld>
 </file>
 
-<file path=ppt/slides/slide26.xml><?xml version="1.0" encoding="utf-8"?>
+<file path=ppt/slides/slide25.xml><?xml version="1.0" encoding="utf-8"?>
 <p:sld xmlns:a="http://schemas.openxmlformats.org/drawingml/2006/main" xmlns:r="http://schemas.openxmlformats.org/officeDocument/2006/relationships" xmlns:p="http://schemas.openxmlformats.org/presentationml/2006/main">
   <p:cSld>
     <p:bg>
@@ -11618,7 +11343,7 @@
 </p:sld>
 </file>
 
-<file path=ppt/slides/slide27.xml><?xml version="1.0" encoding="utf-8"?>
+<file path=ppt/slides/slide26.xml><?xml version="1.0" encoding="utf-8"?>
 <p:sld xmlns:a="http://schemas.openxmlformats.org/drawingml/2006/main" xmlns:r="http://schemas.openxmlformats.org/officeDocument/2006/relationships" xmlns:p="http://schemas.openxmlformats.org/presentationml/2006/main">
   <p:cSld>
     <p:spTree>
@@ -11718,7 +11443,7 @@
 </p:sld>
 </file>
 
-<file path=ppt/slides/slide28.xml><?xml version="1.0" encoding="utf-8"?>
+<file path=ppt/slides/slide27.xml><?xml version="1.0" encoding="utf-8"?>
 <p:sld xmlns:a="http://schemas.openxmlformats.org/drawingml/2006/main" xmlns:r="http://schemas.openxmlformats.org/officeDocument/2006/relationships" xmlns:p="http://schemas.openxmlformats.org/presentationml/2006/main">
   <p:cSld>
     <p:spTree>
@@ -11783,7 +11508,7 @@
 </p:sld>
 </file>
 
-<file path=ppt/slides/slide29.xml><?xml version="1.0" encoding="utf-8"?>
+<file path=ppt/slides/slide28.xml><?xml version="1.0" encoding="utf-8"?>
 <p:sld xmlns:a="http://schemas.openxmlformats.org/drawingml/2006/main" xmlns:r="http://schemas.openxmlformats.org/officeDocument/2006/relationships" xmlns:p="http://schemas.openxmlformats.org/presentationml/2006/main">
   <p:cSld>
     <p:spTree>
@@ -11923,201 +11648,7 @@
 </p:sld>
 </file>
 
-<file path=ppt/slides/slide3.xml><?xml version="1.0" encoding="utf-8"?>
-<p:sld xmlns:a="http://schemas.openxmlformats.org/drawingml/2006/main" xmlns:r="http://schemas.openxmlformats.org/officeDocument/2006/relationships" xmlns:p="http://schemas.openxmlformats.org/presentationml/2006/main">
-  <p:cSld>
-    <p:spTree>
-      <p:nvGrpSpPr>
-        <p:cNvPr id="1" name=""/>
-        <p:cNvGrpSpPr/>
-        <p:nvPr/>
-      </p:nvGrpSpPr>
-      <p:grpSpPr>
-        <a:xfrm>
-          <a:off x="0" y="0"/>
-          <a:ext cx="0" cy="0"/>
-          <a:chOff x="0" y="0"/>
-          <a:chExt cx="0" cy="0"/>
-        </a:xfrm>
-      </p:grpSpPr>
-      <p:sp>
-        <p:nvSpPr>
-          <p:cNvPr id="2" name="Title 1">
-            <a:extLst>
-              <a:ext uri="{FF2B5EF4-FFF2-40B4-BE49-F238E27FC236}">
-                <a16:creationId xmlns:a16="http://schemas.microsoft.com/office/drawing/2014/main" id="{036EB03B-6F62-4CCD-A4CD-12EC24AAF912}"/>
-              </a:ext>
-            </a:extLst>
-          </p:cNvPr>
-          <p:cNvSpPr txBox="1">
-            <a:spLocks noGrp="1"/>
-          </p:cNvSpPr>
-          <p:nvPr>
-            <p:ph type="title"/>
-          </p:nvPr>
-        </p:nvSpPr>
-        <p:spPr/>
-        <p:txBody>
-          <a:bodyPr/>
-          <a:lstStyle/>
-          <a:p>
-            <a:pPr lvl="0">
-              <a:lnSpc>
-                <a:spcPct val="100000"/>
-              </a:lnSpc>
-            </a:pPr>
-            <a:r>
-              <a:rPr lang="en-GB" sz="5400" b="1" kern="0" dirty="0">
-                <a:solidFill>
-                  <a:srgbClr val="006388"/>
-                </a:solidFill>
-                <a:latin typeface="Fira Sans" pitchFamily="34"/>
-                <a:ea typeface="Fira Code" pitchFamily="49"/>
-              </a:rPr>
-              <a:t>In this part</a:t>
-            </a:r>
-            <a:endParaRPr lang="en-GB" sz="1800" kern="0" dirty="0"/>
-          </a:p>
-        </p:txBody>
-      </p:sp>
-      <p:sp>
-        <p:nvSpPr>
-          <p:cNvPr id="3" name="Content Placeholder 2">
-            <a:extLst>
-              <a:ext uri="{FF2B5EF4-FFF2-40B4-BE49-F238E27FC236}">
-                <a16:creationId xmlns:a16="http://schemas.microsoft.com/office/drawing/2014/main" id="{101C6031-0036-4227-9AE0-DCC63CE3973A}"/>
-              </a:ext>
-            </a:extLst>
-          </p:cNvPr>
-          <p:cNvSpPr txBox="1">
-            <a:spLocks noGrp="1"/>
-          </p:cNvSpPr>
-          <p:nvPr>
-            <p:ph idx="1"/>
-          </p:nvPr>
-        </p:nvSpPr>
-        <p:spPr>
-          <a:xfrm>
-            <a:off x="838203" y="1825627"/>
-            <a:ext cx="10515600" cy="4667243"/>
-          </a:xfrm>
-        </p:spPr>
-        <p:txBody>
-          <a:bodyPr>
-            <a:normAutofit/>
-          </a:bodyPr>
-          <a:lstStyle/>
-          <a:p>
-            <a:pPr>
-              <a:lnSpc>
-                <a:spcPct val="100000"/>
-              </a:lnSpc>
-            </a:pPr>
-            <a:r>
-              <a:rPr lang="en-GB" sz="3200" dirty="0">
-                <a:solidFill>
-                  <a:srgbClr val="404040"/>
-                </a:solidFill>
-                <a:latin typeface="Fira Sans" pitchFamily="34"/>
-              </a:rPr>
-              <a:t>Introducing the synthetic control method</a:t>
-            </a:r>
-          </a:p>
-          <a:p>
-            <a:pPr>
-              <a:lnSpc>
-                <a:spcPct val="100000"/>
-              </a:lnSpc>
-            </a:pPr>
-            <a:r>
-              <a:rPr lang="en-GB" sz="3200" dirty="0">
-                <a:solidFill>
-                  <a:srgbClr val="404040"/>
-                </a:solidFill>
-                <a:latin typeface="Fira Sans" pitchFamily="34"/>
-              </a:rPr>
-              <a:t>How to quantify uncertainty</a:t>
-            </a:r>
-          </a:p>
-          <a:p>
-            <a:pPr>
-              <a:lnSpc>
-                <a:spcPct val="100000"/>
-              </a:lnSpc>
-            </a:pPr>
-            <a:r>
-              <a:rPr lang="en-GB" sz="3200" dirty="0">
-                <a:solidFill>
-                  <a:srgbClr val="404040"/>
-                </a:solidFill>
-                <a:latin typeface="Fira Sans" pitchFamily="34"/>
-              </a:rPr>
-              <a:t>What choices do we need to make and how do these impact our causal effect estimates?</a:t>
-            </a:r>
-          </a:p>
-          <a:p>
-            <a:pPr>
-              <a:lnSpc>
-                <a:spcPct val="100000"/>
-              </a:lnSpc>
-            </a:pPr>
-            <a:r>
-              <a:rPr lang="en-GB" sz="3200" dirty="0">
-                <a:solidFill>
-                  <a:srgbClr val="404040"/>
-                </a:solidFill>
-                <a:latin typeface="Fira Sans" pitchFamily="34"/>
-              </a:rPr>
-              <a:t>Performing the synthetic control method with </a:t>
-            </a:r>
-            <a:r>
-              <a:rPr lang="en-GB" sz="3200" dirty="0" err="1">
-                <a:solidFill>
-                  <a:srgbClr val="404040"/>
-                </a:solidFill>
-                <a:latin typeface="Fira Sans" pitchFamily="34"/>
-              </a:rPr>
-              <a:t>tidysynth</a:t>
-            </a:r>
-            <a:r>
-              <a:rPr lang="en-GB" sz="3200" dirty="0">
-                <a:solidFill>
-                  <a:srgbClr val="404040"/>
-                </a:solidFill>
-                <a:latin typeface="Fira Sans" pitchFamily="34"/>
-              </a:rPr>
-              <a:t> package</a:t>
-            </a:r>
-          </a:p>
-          <a:p>
-            <a:pPr>
-              <a:lnSpc>
-                <a:spcPct val="100000"/>
-              </a:lnSpc>
-            </a:pPr>
-            <a:endParaRPr lang="en-GB" sz="3200" dirty="0">
-              <a:solidFill>
-                <a:srgbClr val="404040"/>
-              </a:solidFill>
-              <a:latin typeface="Fira Sans" pitchFamily="34"/>
-            </a:endParaRPr>
-          </a:p>
-        </p:txBody>
-      </p:sp>
-    </p:spTree>
-    <p:extLst>
-      <p:ext uri="{BB962C8B-B14F-4D97-AF65-F5344CB8AC3E}">
-        <p14:creationId xmlns:p14="http://schemas.microsoft.com/office/powerpoint/2010/main" val="3141317725"/>
-      </p:ext>
-    </p:extLst>
-  </p:cSld>
-  <p:clrMapOvr>
-    <a:masterClrMapping/>
-  </p:clrMapOvr>
-</p:sld>
-</file>
-
-<file path=ppt/slides/slide30.xml><?xml version="1.0" encoding="utf-8"?>
+<file path=ppt/slides/slide29.xml><?xml version="1.0" encoding="utf-8"?>
 <p:sld xmlns:a="http://schemas.openxmlformats.org/drawingml/2006/main" xmlns:r="http://schemas.openxmlformats.org/officeDocument/2006/relationships" xmlns:p="http://schemas.openxmlformats.org/presentationml/2006/main">
   <p:cSld>
     <p:spTree>
@@ -12222,7 +11753,201 @@
 </p:sld>
 </file>
 
-<file path=ppt/slides/slide31.xml><?xml version="1.0" encoding="utf-8"?>
+<file path=ppt/slides/slide3.xml><?xml version="1.0" encoding="utf-8"?>
+<p:sld xmlns:a="http://schemas.openxmlformats.org/drawingml/2006/main" xmlns:r="http://schemas.openxmlformats.org/officeDocument/2006/relationships" xmlns:p="http://schemas.openxmlformats.org/presentationml/2006/main">
+  <p:cSld>
+    <p:spTree>
+      <p:nvGrpSpPr>
+        <p:cNvPr id="1" name=""/>
+        <p:cNvGrpSpPr/>
+        <p:nvPr/>
+      </p:nvGrpSpPr>
+      <p:grpSpPr>
+        <a:xfrm>
+          <a:off x="0" y="0"/>
+          <a:ext cx="0" cy="0"/>
+          <a:chOff x="0" y="0"/>
+          <a:chExt cx="0" cy="0"/>
+        </a:xfrm>
+      </p:grpSpPr>
+      <p:sp>
+        <p:nvSpPr>
+          <p:cNvPr id="2" name="Title 1">
+            <a:extLst>
+              <a:ext uri="{FF2B5EF4-FFF2-40B4-BE49-F238E27FC236}">
+                <a16:creationId xmlns:a16="http://schemas.microsoft.com/office/drawing/2014/main" id="{036EB03B-6F62-4CCD-A4CD-12EC24AAF912}"/>
+              </a:ext>
+            </a:extLst>
+          </p:cNvPr>
+          <p:cNvSpPr txBox="1">
+            <a:spLocks noGrp="1"/>
+          </p:cNvSpPr>
+          <p:nvPr>
+            <p:ph type="title"/>
+          </p:nvPr>
+        </p:nvSpPr>
+        <p:spPr/>
+        <p:txBody>
+          <a:bodyPr/>
+          <a:lstStyle/>
+          <a:p>
+            <a:pPr lvl="0">
+              <a:lnSpc>
+                <a:spcPct val="100000"/>
+              </a:lnSpc>
+            </a:pPr>
+            <a:r>
+              <a:rPr lang="en-GB" sz="5400" b="1" kern="0" dirty="0">
+                <a:solidFill>
+                  <a:srgbClr val="006388"/>
+                </a:solidFill>
+                <a:latin typeface="Fira Sans" pitchFamily="34"/>
+                <a:ea typeface="Fira Code" pitchFamily="49"/>
+              </a:rPr>
+              <a:t>In this part</a:t>
+            </a:r>
+            <a:endParaRPr lang="en-GB" sz="1800" kern="0" dirty="0"/>
+          </a:p>
+        </p:txBody>
+      </p:sp>
+      <p:sp>
+        <p:nvSpPr>
+          <p:cNvPr id="3" name="Content Placeholder 2">
+            <a:extLst>
+              <a:ext uri="{FF2B5EF4-FFF2-40B4-BE49-F238E27FC236}">
+                <a16:creationId xmlns:a16="http://schemas.microsoft.com/office/drawing/2014/main" id="{101C6031-0036-4227-9AE0-DCC63CE3973A}"/>
+              </a:ext>
+            </a:extLst>
+          </p:cNvPr>
+          <p:cNvSpPr txBox="1">
+            <a:spLocks noGrp="1"/>
+          </p:cNvSpPr>
+          <p:nvPr>
+            <p:ph idx="1"/>
+          </p:nvPr>
+        </p:nvSpPr>
+        <p:spPr>
+          <a:xfrm>
+            <a:off x="838203" y="1825627"/>
+            <a:ext cx="10515600" cy="4667243"/>
+          </a:xfrm>
+        </p:spPr>
+        <p:txBody>
+          <a:bodyPr>
+            <a:normAutofit/>
+          </a:bodyPr>
+          <a:lstStyle/>
+          <a:p>
+            <a:pPr>
+              <a:lnSpc>
+                <a:spcPct val="100000"/>
+              </a:lnSpc>
+            </a:pPr>
+            <a:r>
+              <a:rPr lang="en-GB" sz="3200" dirty="0">
+                <a:solidFill>
+                  <a:srgbClr val="404040"/>
+                </a:solidFill>
+                <a:latin typeface="Fira Sans" pitchFamily="34"/>
+              </a:rPr>
+              <a:t>Introducing the synthetic control method</a:t>
+            </a:r>
+          </a:p>
+          <a:p>
+            <a:pPr>
+              <a:lnSpc>
+                <a:spcPct val="100000"/>
+              </a:lnSpc>
+            </a:pPr>
+            <a:r>
+              <a:rPr lang="en-GB" sz="3200" dirty="0">
+                <a:solidFill>
+                  <a:srgbClr val="404040"/>
+                </a:solidFill>
+                <a:latin typeface="Fira Sans" pitchFamily="34"/>
+              </a:rPr>
+              <a:t>How to quantify uncertainty</a:t>
+            </a:r>
+          </a:p>
+          <a:p>
+            <a:pPr>
+              <a:lnSpc>
+                <a:spcPct val="100000"/>
+              </a:lnSpc>
+            </a:pPr>
+            <a:r>
+              <a:rPr lang="en-GB" sz="3200" dirty="0">
+                <a:solidFill>
+                  <a:srgbClr val="404040"/>
+                </a:solidFill>
+                <a:latin typeface="Fira Sans" pitchFamily="34"/>
+              </a:rPr>
+              <a:t>What choices do we need to make and how do these impact our causal effect estimates?</a:t>
+            </a:r>
+          </a:p>
+          <a:p>
+            <a:pPr>
+              <a:lnSpc>
+                <a:spcPct val="100000"/>
+              </a:lnSpc>
+            </a:pPr>
+            <a:r>
+              <a:rPr lang="en-GB" sz="3200" dirty="0">
+                <a:solidFill>
+                  <a:srgbClr val="404040"/>
+                </a:solidFill>
+                <a:latin typeface="Fira Sans" pitchFamily="34"/>
+              </a:rPr>
+              <a:t>Performing the synthetic control method with </a:t>
+            </a:r>
+            <a:r>
+              <a:rPr lang="en-GB" sz="3200" dirty="0" err="1">
+                <a:solidFill>
+                  <a:srgbClr val="404040"/>
+                </a:solidFill>
+                <a:latin typeface="Fira Sans" pitchFamily="34"/>
+              </a:rPr>
+              <a:t>tidysynth</a:t>
+            </a:r>
+            <a:r>
+              <a:rPr lang="en-GB" sz="3200" dirty="0">
+                <a:solidFill>
+                  <a:srgbClr val="404040"/>
+                </a:solidFill>
+                <a:latin typeface="Fira Sans" pitchFamily="34"/>
+              </a:rPr>
+              <a:t> package</a:t>
+            </a:r>
+          </a:p>
+          <a:p>
+            <a:pPr>
+              <a:lnSpc>
+                <a:spcPct val="100000"/>
+              </a:lnSpc>
+            </a:pPr>
+            <a:endParaRPr lang="en-GB" sz="3200" dirty="0">
+              <a:solidFill>
+                <a:srgbClr val="404040"/>
+              </a:solidFill>
+              <a:latin typeface="Fira Sans" pitchFamily="34"/>
+            </a:endParaRPr>
+          </a:p>
+        </p:txBody>
+      </p:sp>
+    </p:spTree>
+    <p:extLst>
+      <p:ext uri="{BB962C8B-B14F-4D97-AF65-F5344CB8AC3E}">
+        <p14:creationId xmlns:p14="http://schemas.microsoft.com/office/powerpoint/2010/main" val="3141317725"/>
+      </p:ext>
+    </p:extLst>
+  </p:cSld>
+  <p:clrMapOvr>
+    <a:masterClrMapping/>
+  </p:clrMapOvr>
+</p:sld>
+</file>
+
+<file path=ppt/slides/slide30.xml><?xml version="1.0" encoding="utf-8"?>
 <p:sld xmlns:a="http://schemas.openxmlformats.org/drawingml/2006/main" xmlns:r="http://schemas.openxmlformats.org/officeDocument/2006/relationships" xmlns:p="http://schemas.openxmlformats.org/presentationml/2006/main">
   <p:cSld>
     <p:spTree>
@@ -12367,7 +12092,7 @@
 </p:sld>
 </file>
 
-<file path=ppt/slides/slide32.xml><?xml version="1.0" encoding="utf-8"?>
+<file path=ppt/slides/slide31.xml><?xml version="1.0" encoding="utf-8"?>
 <p:sld xmlns:a="http://schemas.openxmlformats.org/drawingml/2006/main" xmlns:r="http://schemas.openxmlformats.org/officeDocument/2006/relationships" xmlns:p="http://schemas.openxmlformats.org/presentationml/2006/main">
   <p:cSld>
     <p:spTree>
@@ -12433,7 +12158,7 @@
 </p:sld>
 </file>
 
-<file path=ppt/slides/slide33.xml><?xml version="1.0" encoding="utf-8"?>
+<file path=ppt/slides/slide32.xml><?xml version="1.0" encoding="utf-8"?>
 <p:sld xmlns:a="http://schemas.openxmlformats.org/drawingml/2006/main" xmlns:r="http://schemas.openxmlformats.org/officeDocument/2006/relationships" xmlns:p="http://schemas.openxmlformats.org/presentationml/2006/main">
   <p:cSld>
     <p:spTree>
@@ -12543,7 +12268,7 @@
 </p:sld>
 </file>
 
-<file path=ppt/slides/slide34.xml><?xml version="1.0" encoding="utf-8"?>
+<file path=ppt/slides/slide33.xml><?xml version="1.0" encoding="utf-8"?>
 <p:sld xmlns:a="http://schemas.openxmlformats.org/drawingml/2006/main" xmlns:r="http://schemas.openxmlformats.org/officeDocument/2006/relationships" xmlns:p="http://schemas.openxmlformats.org/presentationml/2006/main">
   <p:cSld>
     <p:spTree>
@@ -12609,7 +12334,7 @@
 </p:sld>
 </file>
 
-<file path=ppt/slides/slide35.xml><?xml version="1.0" encoding="utf-8"?>
+<file path=ppt/slides/slide34.xml><?xml version="1.0" encoding="utf-8"?>
 <p:sld xmlns:a="http://schemas.openxmlformats.org/drawingml/2006/main" xmlns:r="http://schemas.openxmlformats.org/officeDocument/2006/relationships" xmlns:p="http://schemas.openxmlformats.org/presentationml/2006/main">
   <p:cSld>
     <p:bg>
@@ -12696,7 +12421,7 @@
 </p:sld>
 </file>
 
-<file path=ppt/slides/slide36.xml><?xml version="1.0" encoding="utf-8"?>
+<file path=ppt/slides/slide35.xml><?xml version="1.0" encoding="utf-8"?>
 <p:sld xmlns:a="http://schemas.openxmlformats.org/drawingml/2006/main" xmlns:r="http://schemas.openxmlformats.org/officeDocument/2006/relationships" xmlns:p="http://schemas.openxmlformats.org/presentationml/2006/main">
   <p:cSld>
     <p:spTree>
@@ -12749,276 +12474,6 @@
           </a:prstGeom>
         </p:spPr>
       </p:pic>
-      <mc:AlternateContent xmlns:mc="http://schemas.openxmlformats.org/markup-compatibility/2006">
-        <mc:Choice xmlns:a14="http://schemas.microsoft.com/office/drawing/2010/main" Requires="a14">
-          <p:sp>
-            <p:nvSpPr>
-              <p:cNvPr id="11" name="TextBox 10">
-                <a:extLst>
-                  <a:ext uri="{FF2B5EF4-FFF2-40B4-BE49-F238E27FC236}">
-                    <a16:creationId xmlns:a16="http://schemas.microsoft.com/office/drawing/2014/main" id="{EE1BCC9E-C2DC-F2C5-F7CE-208D7FBC57E8}"/>
-                  </a:ext>
-                </a:extLst>
-              </p:cNvPr>
-              <p:cNvSpPr txBox="1"/>
-              <p:nvPr/>
-            </p:nvSpPr>
-            <p:spPr>
-              <a:xfrm>
-                <a:off x="9182108" y="2775550"/>
-                <a:ext cx="965200" cy="653449"/>
-              </a:xfrm>
-              <a:prstGeom prst="rect">
-                <a:avLst/>
-              </a:prstGeom>
-              <a:noFill/>
-            </p:spPr>
-            <p:txBody>
-              <a:bodyPr wrap="square">
-                <a:spAutoFit/>
-              </a:bodyPr>
-              <a:lstStyle/>
-              <a:p>
-                <a:pPr/>
-                <a14:m>
-                  <m:oMathPara xmlns:m="http://schemas.openxmlformats.org/officeDocument/2006/math">
-                    <m:oMathParaPr>
-                      <m:jc m:val="centerGroup"/>
-                    </m:oMathParaPr>
-                    <m:oMath xmlns:m="http://schemas.openxmlformats.org/officeDocument/2006/math">
-                      <m:sSubSup>
-                        <m:sSubSupPr>
-                          <m:ctrlPr>
-                            <a:rPr lang="en-US" sz="3600" b="0" i="1" smtClean="0">
-                              <a:solidFill>
-                                <a:srgbClr val="404040"/>
-                              </a:solidFill>
-                              <a:latin typeface="Cambria Math" panose="02040503050406030204" pitchFamily="18" charset="0"/>
-                            </a:rPr>
-                          </m:ctrlPr>
-                        </m:sSubSupPr>
-                        <m:e>
-                          <m:r>
-                            <a:rPr lang="en-US" sz="3600" b="0" i="1" smtClean="0">
-                              <a:solidFill>
-                                <a:srgbClr val="404040"/>
-                              </a:solidFill>
-                              <a:latin typeface="Cambria Math" panose="02040503050406030204" pitchFamily="18" charset="0"/>
-                            </a:rPr>
-                            <m:t>𝑌</m:t>
-                          </m:r>
-                        </m:e>
-                        <m:sub>
-                          <m:r>
-                            <a:rPr lang="en-US" sz="3600" b="0" i="1" smtClean="0">
-                              <a:solidFill>
-                                <a:srgbClr val="404040"/>
-                              </a:solidFill>
-                              <a:latin typeface="Cambria Math" panose="02040503050406030204" pitchFamily="18" charset="0"/>
-                            </a:rPr>
-                            <m:t>𝑡</m:t>
-                          </m:r>
-                        </m:sub>
-                        <m:sup>
-                          <m:r>
-                            <a:rPr lang="en-US" sz="3600" b="0" i="1" smtClean="0">
-                              <a:solidFill>
-                                <a:srgbClr val="404040"/>
-                              </a:solidFill>
-                              <a:latin typeface="Cambria Math" panose="02040503050406030204" pitchFamily="18" charset="0"/>
-                            </a:rPr>
-                            <m:t>0</m:t>
-                          </m:r>
-                        </m:sup>
-                      </m:sSubSup>
-                    </m:oMath>
-                  </m:oMathPara>
-                </a14:m>
-                <a:endParaRPr lang="en-NL" sz="3600" dirty="0"/>
-              </a:p>
-            </p:txBody>
-          </p:sp>
-        </mc:Choice>
-        <mc:Fallback>
-          <p:sp>
-            <p:nvSpPr>
-              <p:cNvPr id="11" name="TextBox 10">
-                <a:extLst>
-                  <a:ext uri="{FF2B5EF4-FFF2-40B4-BE49-F238E27FC236}">
-                    <a16:creationId xmlns:a16="http://schemas.microsoft.com/office/drawing/2014/main" id="{EE1BCC9E-C2DC-F2C5-F7CE-208D7FBC57E8}"/>
-                  </a:ext>
-                </a:extLst>
-              </p:cNvPr>
-              <p:cNvSpPr txBox="1">
-                <a:spLocks noRot="1" noChangeAspect="1" noMove="1" noResize="1" noEditPoints="1" noAdjustHandles="1" noChangeArrowheads="1" noChangeShapeType="1" noTextEdit="1"/>
-              </p:cNvSpPr>
-              <p:nvPr/>
-            </p:nvSpPr>
-            <p:spPr>
-              <a:xfrm>
-                <a:off x="9182108" y="2775550"/>
-                <a:ext cx="965200" cy="653449"/>
-              </a:xfrm>
-              <a:prstGeom prst="rect">
-                <a:avLst/>
-              </a:prstGeom>
-              <a:blipFill>
-                <a:blip r:embed="rId4"/>
-                <a:stretch>
-                  <a:fillRect/>
-                </a:stretch>
-              </a:blipFill>
-            </p:spPr>
-            <p:txBody>
-              <a:bodyPr/>
-              <a:lstStyle/>
-              <a:p>
-                <a:r>
-                  <a:rPr lang="en-NL">
-                    <a:noFill/>
-                  </a:rPr>
-                  <a:t> </a:t>
-                </a:r>
-              </a:p>
-            </p:txBody>
-          </p:sp>
-        </mc:Fallback>
-      </mc:AlternateContent>
-      <mc:AlternateContent xmlns:mc="http://schemas.openxmlformats.org/markup-compatibility/2006">
-        <mc:Choice xmlns:a14="http://schemas.microsoft.com/office/drawing/2010/main" Requires="a14">
-          <p:sp>
-            <p:nvSpPr>
-              <p:cNvPr id="12" name="TextBox 11">
-                <a:extLst>
-                  <a:ext uri="{FF2B5EF4-FFF2-40B4-BE49-F238E27FC236}">
-                    <a16:creationId xmlns:a16="http://schemas.microsoft.com/office/drawing/2014/main" id="{D42522DB-AE89-C8C9-ED16-EA60941B58D2}"/>
-                  </a:ext>
-                </a:extLst>
-              </p:cNvPr>
-              <p:cNvSpPr txBox="1"/>
-              <p:nvPr/>
-            </p:nvSpPr>
-            <p:spPr>
-              <a:xfrm>
-                <a:off x="9461508" y="4236050"/>
-                <a:ext cx="965200" cy="648960"/>
-              </a:xfrm>
-              <a:prstGeom prst="rect">
-                <a:avLst/>
-              </a:prstGeom>
-              <a:noFill/>
-            </p:spPr>
-            <p:txBody>
-              <a:bodyPr wrap="square">
-                <a:spAutoFit/>
-              </a:bodyPr>
-              <a:lstStyle/>
-              <a:p>
-                <a:pPr/>
-                <a14:m>
-                  <m:oMathPara xmlns:m="http://schemas.openxmlformats.org/officeDocument/2006/math">
-                    <m:oMathParaPr>
-                      <m:jc m:val="centerGroup"/>
-                    </m:oMathParaPr>
-                    <m:oMath xmlns:m="http://schemas.openxmlformats.org/officeDocument/2006/math">
-                      <m:sSubSup>
-                        <m:sSubSupPr>
-                          <m:ctrlPr>
-                            <a:rPr lang="en-US" sz="3600" b="0" i="1" smtClean="0">
-                              <a:solidFill>
-                                <a:srgbClr val="404040"/>
-                              </a:solidFill>
-                              <a:latin typeface="Cambria Math" panose="02040503050406030204" pitchFamily="18" charset="0"/>
-                            </a:rPr>
-                          </m:ctrlPr>
-                        </m:sSubSupPr>
-                        <m:e>
-                          <m:r>
-                            <a:rPr lang="en-US" sz="3600" b="0" i="1" smtClean="0">
-                              <a:solidFill>
-                                <a:srgbClr val="404040"/>
-                              </a:solidFill>
-                              <a:latin typeface="Cambria Math" panose="02040503050406030204" pitchFamily="18" charset="0"/>
-                            </a:rPr>
-                            <m:t>𝑌</m:t>
-                          </m:r>
-                        </m:e>
-                        <m:sub>
-                          <m:r>
-                            <a:rPr lang="en-US" sz="3600" b="0" i="1" smtClean="0">
-                              <a:solidFill>
-                                <a:srgbClr val="404040"/>
-                              </a:solidFill>
-                              <a:latin typeface="Cambria Math" panose="02040503050406030204" pitchFamily="18" charset="0"/>
-                            </a:rPr>
-                            <m:t>𝑡</m:t>
-                          </m:r>
-                        </m:sub>
-                        <m:sup>
-                          <m:r>
-                            <a:rPr lang="en-US" sz="3600" b="0" i="1" smtClean="0">
-                              <a:solidFill>
-                                <a:srgbClr val="404040"/>
-                              </a:solidFill>
-                              <a:latin typeface="Cambria Math" panose="02040503050406030204" pitchFamily="18" charset="0"/>
-                            </a:rPr>
-                            <m:t>1</m:t>
-                          </m:r>
-                        </m:sup>
-                      </m:sSubSup>
-                    </m:oMath>
-                  </m:oMathPara>
-                </a14:m>
-                <a:endParaRPr lang="en-NL" sz="3600" dirty="0"/>
-              </a:p>
-            </p:txBody>
-          </p:sp>
-        </mc:Choice>
-        <mc:Fallback>
-          <p:sp>
-            <p:nvSpPr>
-              <p:cNvPr id="12" name="TextBox 11">
-                <a:extLst>
-                  <a:ext uri="{FF2B5EF4-FFF2-40B4-BE49-F238E27FC236}">
-                    <a16:creationId xmlns:a16="http://schemas.microsoft.com/office/drawing/2014/main" id="{D42522DB-AE89-C8C9-ED16-EA60941B58D2}"/>
-                  </a:ext>
-                </a:extLst>
-              </p:cNvPr>
-              <p:cNvSpPr txBox="1">
-                <a:spLocks noRot="1" noChangeAspect="1" noMove="1" noResize="1" noEditPoints="1" noAdjustHandles="1" noChangeArrowheads="1" noChangeShapeType="1" noTextEdit="1"/>
-              </p:cNvSpPr>
-              <p:nvPr/>
-            </p:nvSpPr>
-            <p:spPr>
-              <a:xfrm>
-                <a:off x="9461508" y="4236050"/>
-                <a:ext cx="965200" cy="648960"/>
-              </a:xfrm>
-              <a:prstGeom prst="rect">
-                <a:avLst/>
-              </a:prstGeom>
-              <a:blipFill>
-                <a:blip r:embed="rId5"/>
-                <a:stretch>
-                  <a:fillRect/>
-                </a:stretch>
-              </a:blipFill>
-            </p:spPr>
-            <p:txBody>
-              <a:bodyPr/>
-              <a:lstStyle/>
-              <a:p>
-                <a:r>
-                  <a:rPr lang="en-NL">
-                    <a:noFill/>
-                  </a:rPr>
-                  <a:t> </a:t>
-                </a:r>
-              </a:p>
-            </p:txBody>
-          </p:sp>
-        </mc:Fallback>
-      </mc:AlternateContent>
     </p:spTree>
     <p:extLst>
       <p:ext uri="{BB962C8B-B14F-4D97-AF65-F5344CB8AC3E}">
@@ -13032,7 +12487,7 @@
 </p:sld>
 </file>
 
-<file path=ppt/slides/slide37.xml><?xml version="1.0" encoding="utf-8"?>
+<file path=ppt/slides/slide36.xml><?xml version="1.0" encoding="utf-8"?>
 <p:sld xmlns:a="http://schemas.openxmlformats.org/drawingml/2006/main" xmlns:r="http://schemas.openxmlformats.org/officeDocument/2006/relationships" xmlns:p="http://schemas.openxmlformats.org/presentationml/2006/main">
   <p:cSld>
     <p:spTree>
@@ -13089,8 +12544,8 @@
           </a:p>
         </p:txBody>
       </p:sp>
-      <mc:AlternateContent xmlns:mc="http://schemas.openxmlformats.org/markup-compatibility/2006">
-        <mc:Choice xmlns:a14="http://schemas.microsoft.com/office/drawing/2010/main" Requires="a14">
+      <mc:AlternateContent xmlns:mc="http://schemas.openxmlformats.org/markup-compatibility/2006" xmlns:a14="http://schemas.microsoft.com/office/drawing/2010/main">
+        <mc:Choice Requires="a14">
           <p:sp>
             <p:nvSpPr>
               <p:cNvPr id="3" name="Content Placeholder 2">
@@ -13281,7 +12736,7 @@
             </p:txBody>
           </p:sp>
         </mc:Choice>
-        <mc:Fallback>
+        <mc:Fallback xmlns="">
           <p:sp>
             <p:nvSpPr>
               <p:cNvPr id="3" name="Content Placeholder 2">
@@ -13338,7 +12793,7 @@
 </p:sld>
 </file>
 
-<file path=ppt/slides/slide38.xml><?xml version="1.0" encoding="utf-8"?>
+<file path=ppt/slides/slide37.xml><?xml version="1.0" encoding="utf-8"?>
 <p:sld xmlns:a="http://schemas.openxmlformats.org/drawingml/2006/main" xmlns:r="http://schemas.openxmlformats.org/officeDocument/2006/relationships" xmlns:p="http://schemas.openxmlformats.org/presentationml/2006/main">
   <p:cSld>
     <p:spTree>
@@ -13403,7 +12858,7 @@
 </p:sld>
 </file>
 
-<file path=ppt/slides/slide39.xml><?xml version="1.0" encoding="utf-8"?>
+<file path=ppt/slides/slide38.xml><?xml version="1.0" encoding="utf-8"?>
 <p:sld xmlns:a="http://schemas.openxmlformats.org/drawingml/2006/main" xmlns:r="http://schemas.openxmlformats.org/officeDocument/2006/relationships" xmlns:p="http://schemas.openxmlformats.org/presentationml/2006/main">
   <p:cSld>
     <p:bg>
@@ -13481,6 +12936,215 @@
     <p:extLst>
       <p:ext uri="{BB962C8B-B14F-4D97-AF65-F5344CB8AC3E}">
         <p14:creationId xmlns:p14="http://schemas.microsoft.com/office/powerpoint/2010/main" val="916440319"/>
+      </p:ext>
+    </p:extLst>
+  </p:cSld>
+  <p:clrMapOvr>
+    <a:masterClrMapping/>
+  </p:clrMapOvr>
+</p:sld>
+</file>
+
+<file path=ppt/slides/slide39.xml><?xml version="1.0" encoding="utf-8"?>
+<p:sld xmlns:a="http://schemas.openxmlformats.org/drawingml/2006/main" xmlns:r="http://schemas.openxmlformats.org/officeDocument/2006/relationships" xmlns:p="http://schemas.openxmlformats.org/presentationml/2006/main">
+  <p:cSld>
+    <p:spTree>
+      <p:nvGrpSpPr>
+        <p:cNvPr id="1" name=""/>
+        <p:cNvGrpSpPr/>
+        <p:nvPr/>
+      </p:nvGrpSpPr>
+      <p:grpSpPr>
+        <a:xfrm>
+          <a:off x="0" y="0"/>
+          <a:ext cx="0" cy="0"/>
+          <a:chOff x="0" y="0"/>
+          <a:chExt cx="0" cy="0"/>
+        </a:xfrm>
+      </p:grpSpPr>
+      <p:sp>
+        <p:nvSpPr>
+          <p:cNvPr id="2" name="Title 1">
+            <a:extLst>
+              <a:ext uri="{FF2B5EF4-FFF2-40B4-BE49-F238E27FC236}">
+                <a16:creationId xmlns:a16="http://schemas.microsoft.com/office/drawing/2014/main" id="{036EB03B-6F62-4CCD-A4CD-12EC24AAF912}"/>
+              </a:ext>
+            </a:extLst>
+          </p:cNvPr>
+          <p:cNvSpPr txBox="1">
+            <a:spLocks noGrp="1"/>
+          </p:cNvSpPr>
+          <p:nvPr>
+            <p:ph type="title"/>
+          </p:nvPr>
+        </p:nvSpPr>
+        <p:spPr/>
+        <p:txBody>
+          <a:bodyPr/>
+          <a:lstStyle/>
+          <a:p>
+            <a:pPr lvl="0">
+              <a:lnSpc>
+                <a:spcPct val="100000"/>
+              </a:lnSpc>
+            </a:pPr>
+            <a:r>
+              <a:rPr lang="en-GB" sz="5400" b="1" kern="0" dirty="0">
+                <a:solidFill>
+                  <a:srgbClr val="006388"/>
+                </a:solidFill>
+                <a:latin typeface="Fira Sans" pitchFamily="34"/>
+                <a:ea typeface="Fira Code" pitchFamily="49"/>
+              </a:rPr>
+              <a:t>There are many choices</a:t>
+            </a:r>
+            <a:endParaRPr lang="en-GB" sz="1800" kern="0" dirty="0"/>
+          </a:p>
+        </p:txBody>
+      </p:sp>
+      <p:sp>
+        <p:nvSpPr>
+          <p:cNvPr id="3" name="Content Placeholder 2">
+            <a:extLst>
+              <a:ext uri="{FF2B5EF4-FFF2-40B4-BE49-F238E27FC236}">
+                <a16:creationId xmlns:a16="http://schemas.microsoft.com/office/drawing/2014/main" id="{101C6031-0036-4227-9AE0-DCC63CE3973A}"/>
+              </a:ext>
+            </a:extLst>
+          </p:cNvPr>
+          <p:cNvSpPr txBox="1">
+            <a:spLocks noGrp="1"/>
+          </p:cNvSpPr>
+          <p:nvPr>
+            <p:ph idx="1"/>
+          </p:nvPr>
+        </p:nvSpPr>
+        <p:spPr>
+          <a:xfrm>
+            <a:off x="838204" y="1825628"/>
+            <a:ext cx="10312396" cy="4667243"/>
+          </a:xfrm>
+        </p:spPr>
+        <p:txBody>
+          <a:bodyPr>
+            <a:normAutofit/>
+          </a:bodyPr>
+          <a:lstStyle/>
+          <a:p>
+            <a:pPr>
+              <a:lnSpc>
+                <a:spcPct val="110000"/>
+              </a:lnSpc>
+            </a:pPr>
+            <a:r>
+              <a:rPr lang="en-US" sz="3200" dirty="0">
+                <a:solidFill>
+                  <a:srgbClr val="404040"/>
+                </a:solidFill>
+                <a:latin typeface="Fira Sans" pitchFamily="34"/>
+              </a:rPr>
+              <a:t>Which units in the donor pool?</a:t>
+            </a:r>
+          </a:p>
+          <a:p>
+            <a:pPr>
+              <a:lnSpc>
+                <a:spcPct val="110000"/>
+              </a:lnSpc>
+            </a:pPr>
+            <a:r>
+              <a:rPr lang="en-US" sz="3200" dirty="0">
+                <a:solidFill>
+                  <a:srgbClr val="404040"/>
+                </a:solidFill>
+                <a:latin typeface="Fira Sans" pitchFamily="34"/>
+              </a:rPr>
+              <a:t>Which control variables?</a:t>
+            </a:r>
+          </a:p>
+          <a:p>
+            <a:pPr>
+              <a:lnSpc>
+                <a:spcPct val="110000"/>
+              </a:lnSpc>
+            </a:pPr>
+            <a:r>
+              <a:rPr lang="en-US" sz="3200" dirty="0">
+                <a:solidFill>
+                  <a:srgbClr val="404040"/>
+                </a:solidFill>
+                <a:latin typeface="Fira Sans" pitchFamily="34"/>
+              </a:rPr>
+              <a:t>What should my weights optimize?</a:t>
+            </a:r>
+          </a:p>
+          <a:p>
+            <a:pPr>
+              <a:lnSpc>
+                <a:spcPct val="110000"/>
+              </a:lnSpc>
+            </a:pPr>
+            <a:r>
+              <a:rPr lang="en-US" sz="3200" dirty="0">
+                <a:solidFill>
+                  <a:srgbClr val="404040"/>
+                </a:solidFill>
+                <a:latin typeface="Fira Sans" pitchFamily="34"/>
+              </a:rPr>
+              <a:t>How many nonzero unit weights should I get?</a:t>
+            </a:r>
+          </a:p>
+          <a:p>
+            <a:pPr>
+              <a:lnSpc>
+                <a:spcPct val="110000"/>
+              </a:lnSpc>
+            </a:pPr>
+            <a:r>
+              <a:rPr lang="en-US" sz="3200" dirty="0">
+                <a:solidFill>
+                  <a:srgbClr val="404040"/>
+                </a:solidFill>
+                <a:latin typeface="Fira Sans" pitchFamily="34"/>
+              </a:rPr>
+              <a:t>What settings do I give to the nonlinear optimizer?</a:t>
+            </a:r>
+          </a:p>
+          <a:p>
+            <a:pPr>
+              <a:lnSpc>
+                <a:spcPct val="110000"/>
+              </a:lnSpc>
+            </a:pPr>
+            <a:endParaRPr lang="en-US" sz="3200" dirty="0">
+              <a:solidFill>
+                <a:srgbClr val="404040"/>
+              </a:solidFill>
+              <a:latin typeface="Fira Sans" pitchFamily="34"/>
+            </a:endParaRPr>
+          </a:p>
+          <a:p>
+            <a:pPr marL="0" indent="0">
+              <a:lnSpc>
+                <a:spcPct val="110000"/>
+              </a:lnSpc>
+              <a:buNone/>
+            </a:pPr>
+            <a:r>
+              <a:rPr lang="en-US" sz="3200" dirty="0">
+                <a:solidFill>
+                  <a:srgbClr val="404040"/>
+                </a:solidFill>
+                <a:latin typeface="Fira Sans" pitchFamily="34"/>
+              </a:rPr>
+              <a:t>“researcher degrees of freedom”</a:t>
+            </a:r>
+          </a:p>
+        </p:txBody>
+      </p:sp>
+    </p:spTree>
+    <p:extLst>
+      <p:ext uri="{BB962C8B-B14F-4D97-AF65-F5344CB8AC3E}">
+        <p14:creationId xmlns:p14="http://schemas.microsoft.com/office/powerpoint/2010/main" val="2703230073"/>
       </p:ext>
     </p:extLst>
   </p:cSld>
@@ -13629,217 +13293,8 @@
           </a:p>
         </p:txBody>
       </p:sp>
-      <p:sp>
-        <p:nvSpPr>
-          <p:cNvPr id="3" name="Content Placeholder 2">
-            <a:extLst>
-              <a:ext uri="{FF2B5EF4-FFF2-40B4-BE49-F238E27FC236}">
-                <a16:creationId xmlns:a16="http://schemas.microsoft.com/office/drawing/2014/main" id="{101C6031-0036-4227-9AE0-DCC63CE3973A}"/>
-              </a:ext>
-            </a:extLst>
-          </p:cNvPr>
-          <p:cNvSpPr txBox="1">
-            <a:spLocks noGrp="1"/>
-          </p:cNvSpPr>
-          <p:nvPr>
-            <p:ph idx="1"/>
-          </p:nvPr>
-        </p:nvSpPr>
-        <p:spPr>
-          <a:xfrm>
-            <a:off x="838204" y="1825628"/>
-            <a:ext cx="10312396" cy="4667243"/>
-          </a:xfrm>
-        </p:spPr>
-        <p:txBody>
-          <a:bodyPr>
-            <a:normAutofit/>
-          </a:bodyPr>
-          <a:lstStyle/>
-          <a:p>
-            <a:pPr>
-              <a:lnSpc>
-                <a:spcPct val="110000"/>
-              </a:lnSpc>
-            </a:pPr>
-            <a:r>
-              <a:rPr lang="en-US" sz="3200" dirty="0">
-                <a:solidFill>
-                  <a:srgbClr val="404040"/>
-                </a:solidFill>
-                <a:latin typeface="Fira Sans" pitchFamily="34"/>
-              </a:rPr>
-              <a:t>Which units in the donor pool?</a:t>
-            </a:r>
-          </a:p>
-          <a:p>
-            <a:pPr>
-              <a:lnSpc>
-                <a:spcPct val="110000"/>
-              </a:lnSpc>
-            </a:pPr>
-            <a:r>
-              <a:rPr lang="en-US" sz="3200" dirty="0">
-                <a:solidFill>
-                  <a:srgbClr val="404040"/>
-                </a:solidFill>
-                <a:latin typeface="Fira Sans" pitchFamily="34"/>
-              </a:rPr>
-              <a:t>Which control variables?</a:t>
-            </a:r>
-          </a:p>
-          <a:p>
-            <a:pPr>
-              <a:lnSpc>
-                <a:spcPct val="110000"/>
-              </a:lnSpc>
-            </a:pPr>
-            <a:r>
-              <a:rPr lang="en-US" sz="3200" dirty="0">
-                <a:solidFill>
-                  <a:srgbClr val="404040"/>
-                </a:solidFill>
-                <a:latin typeface="Fira Sans" pitchFamily="34"/>
-              </a:rPr>
-              <a:t>What should my weights optimize?</a:t>
-            </a:r>
-          </a:p>
-          <a:p>
-            <a:pPr>
-              <a:lnSpc>
-                <a:spcPct val="110000"/>
-              </a:lnSpc>
-            </a:pPr>
-            <a:r>
-              <a:rPr lang="en-US" sz="3200" dirty="0">
-                <a:solidFill>
-                  <a:srgbClr val="404040"/>
-                </a:solidFill>
-                <a:latin typeface="Fira Sans" pitchFamily="34"/>
-              </a:rPr>
-              <a:t>How many nonzero unit weights should I get?</a:t>
-            </a:r>
-          </a:p>
-          <a:p>
-            <a:pPr>
-              <a:lnSpc>
-                <a:spcPct val="110000"/>
-              </a:lnSpc>
-            </a:pPr>
-            <a:r>
-              <a:rPr lang="en-US" sz="3200" dirty="0">
-                <a:solidFill>
-                  <a:srgbClr val="404040"/>
-                </a:solidFill>
-                <a:latin typeface="Fira Sans" pitchFamily="34"/>
-              </a:rPr>
-              <a:t>What settings do I give to the nonlinear optimizer?</a:t>
-            </a:r>
-          </a:p>
-          <a:p>
-            <a:pPr>
-              <a:lnSpc>
-                <a:spcPct val="110000"/>
-              </a:lnSpc>
-            </a:pPr>
-            <a:endParaRPr lang="en-US" sz="3200" dirty="0">
-              <a:solidFill>
-                <a:srgbClr val="404040"/>
-              </a:solidFill>
-              <a:latin typeface="Fira Sans" pitchFamily="34"/>
-            </a:endParaRPr>
-          </a:p>
-          <a:p>
-            <a:pPr marL="0" indent="0">
-              <a:lnSpc>
-                <a:spcPct val="110000"/>
-              </a:lnSpc>
-              <a:buNone/>
-            </a:pPr>
-            <a:r>
-              <a:rPr lang="en-US" sz="3200" dirty="0">
-                <a:solidFill>
-                  <a:srgbClr val="404040"/>
-                </a:solidFill>
-                <a:latin typeface="Fira Sans" pitchFamily="34"/>
-              </a:rPr>
-              <a:t>“researcher degrees of freedom”</a:t>
-            </a:r>
-          </a:p>
-        </p:txBody>
-      </p:sp>
-    </p:spTree>
-    <p:extLst>
-      <p:ext uri="{BB962C8B-B14F-4D97-AF65-F5344CB8AC3E}">
-        <p14:creationId xmlns:p14="http://schemas.microsoft.com/office/powerpoint/2010/main" val="2703230073"/>
-      </p:ext>
-    </p:extLst>
-  </p:cSld>
-  <p:clrMapOvr>
-    <a:masterClrMapping/>
-  </p:clrMapOvr>
-</p:sld>
-</file>
-
-<file path=ppt/slides/slide41.xml><?xml version="1.0" encoding="utf-8"?>
-<p:sld xmlns:a="http://schemas.openxmlformats.org/drawingml/2006/main" xmlns:r="http://schemas.openxmlformats.org/officeDocument/2006/relationships" xmlns:p="http://schemas.openxmlformats.org/presentationml/2006/main">
-  <p:cSld>
-    <p:spTree>
-      <p:nvGrpSpPr>
-        <p:cNvPr id="1" name=""/>
-        <p:cNvGrpSpPr/>
-        <p:nvPr/>
-      </p:nvGrpSpPr>
-      <p:grpSpPr>
-        <a:xfrm>
-          <a:off x="0" y="0"/>
-          <a:ext cx="0" cy="0"/>
-          <a:chOff x="0" y="0"/>
-          <a:chExt cx="0" cy="0"/>
-        </a:xfrm>
-      </p:grpSpPr>
-      <p:sp>
-        <p:nvSpPr>
-          <p:cNvPr id="2" name="Title 1">
-            <a:extLst>
-              <a:ext uri="{FF2B5EF4-FFF2-40B4-BE49-F238E27FC236}">
-                <a16:creationId xmlns:a16="http://schemas.microsoft.com/office/drawing/2014/main" id="{036EB03B-6F62-4CCD-A4CD-12EC24AAF912}"/>
-              </a:ext>
-            </a:extLst>
-          </p:cNvPr>
-          <p:cNvSpPr txBox="1">
-            <a:spLocks noGrp="1"/>
-          </p:cNvSpPr>
-          <p:nvPr>
-            <p:ph type="title"/>
-          </p:nvPr>
-        </p:nvSpPr>
-        <p:spPr/>
-        <p:txBody>
-          <a:bodyPr/>
-          <a:lstStyle/>
-          <a:p>
-            <a:pPr lvl="0">
-              <a:lnSpc>
-                <a:spcPct val="100000"/>
-              </a:lnSpc>
-            </a:pPr>
-            <a:r>
-              <a:rPr lang="en-GB" sz="5400" b="1" kern="0" dirty="0">
-                <a:solidFill>
-                  <a:srgbClr val="006388"/>
-                </a:solidFill>
-                <a:latin typeface="Fira Sans" pitchFamily="34"/>
-                <a:ea typeface="Fira Code" pitchFamily="49"/>
-              </a:rPr>
-              <a:t>There are many choices</a:t>
-            </a:r>
-            <a:endParaRPr lang="en-GB" sz="1800" kern="0" dirty="0"/>
-          </a:p>
-        </p:txBody>
-      </p:sp>
-      <mc:AlternateContent xmlns:mc="http://schemas.openxmlformats.org/markup-compatibility/2006">
-        <mc:Choice xmlns:a14="http://schemas.microsoft.com/office/drawing/2010/main" Requires="a14">
+      <mc:AlternateContent xmlns:mc="http://schemas.openxmlformats.org/markup-compatibility/2006" xmlns:a14="http://schemas.microsoft.com/office/drawing/2010/main">
+        <mc:Choice Requires="a14">
           <p:sp>
             <p:nvSpPr>
               <p:cNvPr id="3" name="Content Placeholder 2">
@@ -14010,7 +13465,7 @@
             </p:txBody>
           </p:sp>
         </mc:Choice>
-        <mc:Fallback>
+        <mc:Fallback xmlns="">
           <p:sp>
             <p:nvSpPr>
               <p:cNvPr id="3" name="Content Placeholder 2">
@@ -14058,6 +13513,111 @@
     <p:extLst>
       <p:ext uri="{BB962C8B-B14F-4D97-AF65-F5344CB8AC3E}">
         <p14:creationId xmlns:p14="http://schemas.microsoft.com/office/powerpoint/2010/main" val="2613123646"/>
+      </p:ext>
+    </p:extLst>
+  </p:cSld>
+  <p:clrMapOvr>
+    <a:masterClrMapping/>
+  </p:clrMapOvr>
+</p:sld>
+</file>
+
+<file path=ppt/slides/slide41.xml><?xml version="1.0" encoding="utf-8"?>
+<p:sld xmlns:a="http://schemas.openxmlformats.org/drawingml/2006/main" xmlns:r="http://schemas.openxmlformats.org/officeDocument/2006/relationships" xmlns:p="http://schemas.openxmlformats.org/presentationml/2006/main">
+  <p:cSld>
+    <p:spTree>
+      <p:nvGrpSpPr>
+        <p:cNvPr id="1" name=""/>
+        <p:cNvGrpSpPr/>
+        <p:nvPr/>
+      </p:nvGrpSpPr>
+      <p:grpSpPr>
+        <a:xfrm>
+          <a:off x="0" y="0"/>
+          <a:ext cx="0" cy="0"/>
+          <a:chOff x="0" y="0"/>
+          <a:chExt cx="0" cy="0"/>
+        </a:xfrm>
+      </p:grpSpPr>
+      <p:pic>
+        <p:nvPicPr>
+          <p:cNvPr id="5" name="Picture 4">
+            <a:extLst>
+              <a:ext uri="{FF2B5EF4-FFF2-40B4-BE49-F238E27FC236}">
+                <a16:creationId xmlns:a16="http://schemas.microsoft.com/office/drawing/2014/main" id="{881951C7-3C93-C1EA-4C06-39AF82477FC7}"/>
+              </a:ext>
+            </a:extLst>
+          </p:cNvPr>
+          <p:cNvPicPr>
+            <a:picLocks noChangeAspect="1"/>
+          </p:cNvPicPr>
+          <p:nvPr/>
+        </p:nvPicPr>
+        <p:blipFill>
+          <a:blip r:embed="rId2"/>
+          <a:stretch>
+            <a:fillRect/>
+          </a:stretch>
+        </p:blipFill>
+        <p:spPr>
+          <a:xfrm>
+            <a:off x="3216363" y="1690688"/>
+            <a:ext cx="5759273" cy="4936959"/>
+          </a:xfrm>
+          <a:prstGeom prst="rect">
+            <a:avLst/>
+          </a:prstGeom>
+        </p:spPr>
+      </p:pic>
+      <p:sp>
+        <p:nvSpPr>
+          <p:cNvPr id="6" name="Title 1">
+            <a:extLst>
+              <a:ext uri="{FF2B5EF4-FFF2-40B4-BE49-F238E27FC236}">
+                <a16:creationId xmlns:a16="http://schemas.microsoft.com/office/drawing/2014/main" id="{1B9B20B9-28BA-4420-57B3-687A8A5714D9}"/>
+              </a:ext>
+            </a:extLst>
+          </p:cNvPr>
+          <p:cNvSpPr txBox="1">
+            <a:spLocks noGrp="1"/>
+          </p:cNvSpPr>
+          <p:nvPr>
+            <p:ph type="title"/>
+          </p:nvPr>
+        </p:nvSpPr>
+        <p:spPr>
+          <a:xfrm>
+            <a:off x="838203" y="365129"/>
+            <a:ext cx="10515600" cy="1325559"/>
+          </a:xfrm>
+        </p:spPr>
+        <p:txBody>
+          <a:bodyPr/>
+          <a:lstStyle/>
+          <a:p>
+            <a:pPr lvl="0">
+              <a:lnSpc>
+                <a:spcPct val="100000"/>
+              </a:lnSpc>
+            </a:pPr>
+            <a:r>
+              <a:rPr lang="en-GB" sz="5400" b="1" kern="0" dirty="0">
+                <a:solidFill>
+                  <a:srgbClr val="006388"/>
+                </a:solidFill>
+                <a:latin typeface="Fira Sans" pitchFamily="34"/>
+                <a:ea typeface="Fira Code" pitchFamily="49"/>
+              </a:rPr>
+              <a:t>Leave-one-unit-out validation</a:t>
+            </a:r>
+            <a:endParaRPr lang="en-GB" sz="1800" kern="0" dirty="0"/>
+          </a:p>
+        </p:txBody>
+      </p:sp>
+    </p:spTree>
+    <p:extLst>
+      <p:ext uri="{BB962C8B-B14F-4D97-AF65-F5344CB8AC3E}">
+        <p14:creationId xmlns:p14="http://schemas.microsoft.com/office/powerpoint/2010/main" val="3264062137"/>
       </p:ext>
     </p:extLst>
   </p:cSld>
@@ -15900,8 +15460,8 @@
           </a:p>
         </p:txBody>
       </p:sp>
-      <mc:AlternateContent xmlns:mc="http://schemas.openxmlformats.org/markup-compatibility/2006">
-        <mc:Choice xmlns:a14="http://schemas.microsoft.com/office/drawing/2010/main" Requires="a14">
+      <mc:AlternateContent xmlns:mc="http://schemas.openxmlformats.org/markup-compatibility/2006" xmlns:a14="http://schemas.microsoft.com/office/drawing/2010/main">
+        <mc:Choice Requires="a14">
           <p:sp>
             <p:nvSpPr>
               <p:cNvPr id="3" name="Content Placeholder 2">
@@ -16278,7 +15838,7 @@
             </p:txBody>
           </p:sp>
         </mc:Choice>
-        <mc:Fallback>
+        <mc:Fallback xmlns="">
           <p:sp>
             <p:nvSpPr>
               <p:cNvPr id="3" name="Content Placeholder 2">
@@ -16392,8 +15952,8 @@
           </a:p>
         </p:txBody>
       </p:sp>
-      <mc:AlternateContent xmlns:mc="http://schemas.openxmlformats.org/markup-compatibility/2006">
-        <mc:Choice xmlns:a14="http://schemas.microsoft.com/office/drawing/2010/main" Requires="a14">
+      <mc:AlternateContent xmlns:mc="http://schemas.openxmlformats.org/markup-compatibility/2006" xmlns:a14="http://schemas.microsoft.com/office/drawing/2010/main">
+        <mc:Choice Requires="a14">
           <p:sp>
             <p:nvSpPr>
               <p:cNvPr id="3" name="Content Placeholder 2">
@@ -16791,7 +16351,7 @@
             </p:txBody>
           </p:sp>
         </mc:Choice>
-        <mc:Fallback>
+        <mc:Fallback xmlns="">
           <p:sp>
             <p:nvSpPr>
               <p:cNvPr id="3" name="Content Placeholder 2">

</xml_diff>